<commit_message>
fixed some stuff. Made some updates
</commit_message>
<xml_diff>
--- a/nick MPA 18.pptx
+++ b/nick MPA 18.pptx
@@ -248,7 +248,7 @@
             <a:fld id="{FD943D7A-167B-4D1B-8238-B31E320746FF}" type="datetimeFigureOut">
               <a:rPr lang="en-US"/>
               <a:pPr/>
-              <a:t>3/26/2018</a:t>
+              <a:t>3/27/2018</a:t>
             </a:fld>
             <a:endParaRPr lang="en-US"/>
           </a:p>
@@ -732,7 +732,7 @@
           <a:p>
             <a:fld id="{663379F8-D3CD-4F84-8ABE-D8B7DBD32689}" type="datetimeFigureOut">
               <a:rPr lang="en-US" smtClean="0"/>
-              <a:t>3/26/2018</a:t>
+              <a:t>3/27/2018</a:t>
             </a:fld>
             <a:endParaRPr lang="en-US"/>
           </a:p>
@@ -903,7 +903,7 @@
           <a:p>
             <a:fld id="{663379F8-D3CD-4F84-8ABE-D8B7DBD32689}" type="datetimeFigureOut">
               <a:rPr lang="en-US" smtClean="0"/>
-              <a:t>3/26/2018</a:t>
+              <a:t>3/27/2018</a:t>
             </a:fld>
             <a:endParaRPr lang="en-US"/>
           </a:p>
@@ -1084,7 +1084,7 @@
           <a:p>
             <a:fld id="{663379F8-D3CD-4F84-8ABE-D8B7DBD32689}" type="datetimeFigureOut">
               <a:rPr lang="en-US" smtClean="0"/>
-              <a:t>3/26/2018</a:t>
+              <a:t>3/27/2018</a:t>
             </a:fld>
             <a:endParaRPr lang="en-US"/>
           </a:p>
@@ -1255,7 +1255,7 @@
           <a:p>
             <a:fld id="{663379F8-D3CD-4F84-8ABE-D8B7DBD32689}" type="datetimeFigureOut">
               <a:rPr lang="en-US" smtClean="0"/>
-              <a:t>3/26/2018</a:t>
+              <a:t>3/27/2018</a:t>
             </a:fld>
             <a:endParaRPr lang="en-US"/>
           </a:p>
@@ -1500,7 +1500,7 @@
           <a:p>
             <a:fld id="{663379F8-D3CD-4F84-8ABE-D8B7DBD32689}" type="datetimeFigureOut">
               <a:rPr lang="en-US" smtClean="0"/>
-              <a:t>3/26/2018</a:t>
+              <a:t>3/27/2018</a:t>
             </a:fld>
             <a:endParaRPr lang="en-US"/>
           </a:p>
@@ -1733,7 +1733,7 @@
           <a:p>
             <a:fld id="{663379F8-D3CD-4F84-8ABE-D8B7DBD32689}" type="datetimeFigureOut">
               <a:rPr lang="en-US" smtClean="0"/>
-              <a:t>3/26/2018</a:t>
+              <a:t>3/27/2018</a:t>
             </a:fld>
             <a:endParaRPr lang="en-US"/>
           </a:p>
@@ -2101,7 +2101,7 @@
           <a:p>
             <a:fld id="{663379F8-D3CD-4F84-8ABE-D8B7DBD32689}" type="datetimeFigureOut">
               <a:rPr lang="en-US" smtClean="0"/>
-              <a:t>3/26/2018</a:t>
+              <a:t>3/27/2018</a:t>
             </a:fld>
             <a:endParaRPr lang="en-US"/>
           </a:p>
@@ -2220,7 +2220,7 @@
           <a:p>
             <a:fld id="{663379F8-D3CD-4F84-8ABE-D8B7DBD32689}" type="datetimeFigureOut">
               <a:rPr lang="en-US" smtClean="0"/>
-              <a:t>3/26/2018</a:t>
+              <a:t>3/27/2018</a:t>
             </a:fld>
             <a:endParaRPr lang="en-US"/>
           </a:p>
@@ -2316,7 +2316,7 @@
           <a:p>
             <a:fld id="{663379F8-D3CD-4F84-8ABE-D8B7DBD32689}" type="datetimeFigureOut">
               <a:rPr lang="en-US" smtClean="0"/>
-              <a:t>3/26/2018</a:t>
+              <a:t>3/27/2018</a:t>
             </a:fld>
             <a:endParaRPr lang="en-US"/>
           </a:p>
@@ -2594,7 +2594,7 @@
           <a:p>
             <a:fld id="{663379F8-D3CD-4F84-8ABE-D8B7DBD32689}" type="datetimeFigureOut">
               <a:rPr lang="en-US" smtClean="0"/>
-              <a:t>3/26/2018</a:t>
+              <a:t>3/27/2018</a:t>
             </a:fld>
             <a:endParaRPr lang="en-US"/>
           </a:p>
@@ -2852,7 +2852,7 @@
           <a:p>
             <a:fld id="{663379F8-D3CD-4F84-8ABE-D8B7DBD32689}" type="datetimeFigureOut">
               <a:rPr lang="en-US" smtClean="0"/>
-              <a:t>3/26/2018</a:t>
+              <a:t>3/27/2018</a:t>
             </a:fld>
             <a:endParaRPr lang="en-US"/>
           </a:p>
@@ -3066,7 +3066,7 @@
           <a:p>
             <a:fld id="{663379F8-D3CD-4F84-8ABE-D8B7DBD32689}" type="datetimeFigureOut">
               <a:rPr lang="en-US" smtClean="0"/>
-              <a:t>3/26/2018</a:t>
+              <a:t>3/27/2018</a:t>
             </a:fld>
             <a:endParaRPr lang="en-US"/>
           </a:p>
@@ -3703,7 +3703,7 @@
           </a:ln>
           <a:extLst>
             <a:ext uri="{909E8E84-426E-40dd-AFC4-6F175D3DCCD1}">
-              <a14:hiddenFill xmlns:a14="http://schemas.microsoft.com/office/drawing/2010/main" xmlns="">
+              <a14:hiddenFill xmlns="" xmlns:a14="http://schemas.microsoft.com/office/drawing/2010/main">
                 <a:noFill/>
               </a14:hiddenFill>
             </a:ext>
@@ -3753,7 +3753,7 @@
           </a:ln>
           <a:extLst>
             <a:ext uri="{909E8E84-426E-40dd-AFC4-6F175D3DCCD1}">
-              <a14:hiddenFill xmlns:a14="http://schemas.microsoft.com/office/drawing/2010/main" xmlns="">
+              <a14:hiddenFill xmlns="" xmlns:a14="http://schemas.microsoft.com/office/drawing/2010/main">
                 <a:noFill/>
               </a14:hiddenFill>
             </a:ext>
@@ -3803,7 +3803,7 @@
           </a:ln>
           <a:extLst>
             <a:ext uri="{909E8E84-426E-40dd-AFC4-6F175D3DCCD1}">
-              <a14:hiddenFill xmlns:a14="http://schemas.microsoft.com/office/drawing/2010/main" xmlns="">
+              <a14:hiddenFill xmlns="" xmlns:a14="http://schemas.microsoft.com/office/drawing/2010/main">
                 <a:noFill/>
               </a14:hiddenFill>
             </a:ext>
@@ -3853,14 +3853,14 @@
           </a:ln>
           <a:extLst>
             <a:ext uri="{909E8E84-426E-40dd-AFC4-6F175D3DCCD1}">
-              <a14:hiddenFill xmlns:a14="http://schemas.microsoft.com/office/drawing/2010/main" xmlns="">
+              <a14:hiddenFill xmlns="" xmlns:a14="http://schemas.microsoft.com/office/drawing/2010/main">
                 <a:solidFill>
                   <a:srgbClr val="FFFFFF"/>
                 </a:solidFill>
               </a14:hiddenFill>
             </a:ext>
             <a:ext uri="{91240B29-F687-4f45-9708-019B960494DF}">
-              <a14:hiddenLine xmlns:a14="http://schemas.microsoft.com/office/drawing/2010/main" xmlns="" w="12700" cap="rnd">
+              <a14:hiddenLine xmlns="" xmlns:a14="http://schemas.microsoft.com/office/drawing/2010/main" w="12700" cap="rnd">
                 <a:solidFill>
                   <a:schemeClr val="tx1"/>
                 </a:solidFill>
@@ -4063,14 +4063,14 @@
           </a:ln>
           <a:extLst>
             <a:ext uri="{909E8E84-426E-40dd-AFC4-6F175D3DCCD1}">
-              <a14:hiddenFill xmlns:a14="http://schemas.microsoft.com/office/drawing/2010/main" xmlns="">
+              <a14:hiddenFill xmlns="" xmlns:a14="http://schemas.microsoft.com/office/drawing/2010/main">
                 <a:solidFill>
                   <a:srgbClr val="FFFFFF"/>
                 </a:solidFill>
               </a14:hiddenFill>
             </a:ext>
             <a:ext uri="{91240B29-F687-4f45-9708-019B960494DF}">
-              <a14:hiddenLine xmlns:a14="http://schemas.microsoft.com/office/drawing/2010/main" xmlns="" w="12700" cap="rnd">
+              <a14:hiddenLine xmlns="" xmlns:a14="http://schemas.microsoft.com/office/drawing/2010/main" w="12700" cap="rnd">
                 <a:solidFill>
                   <a:schemeClr val="tx1"/>
                 </a:solidFill>
@@ -4237,14 +4237,14 @@
           </a:ln>
           <a:extLst>
             <a:ext uri="{909E8E84-426E-40dd-AFC4-6F175D3DCCD1}">
-              <a14:hiddenFill xmlns:a14="http://schemas.microsoft.com/office/drawing/2010/main" xmlns="">
+              <a14:hiddenFill xmlns="" xmlns:a14="http://schemas.microsoft.com/office/drawing/2010/main">
                 <a:solidFill>
                   <a:srgbClr val="FFFFFF"/>
                 </a:solidFill>
               </a14:hiddenFill>
             </a:ext>
             <a:ext uri="{91240B29-F687-4f45-9708-019B960494DF}">
-              <a14:hiddenLine xmlns:a14="http://schemas.microsoft.com/office/drawing/2010/main" xmlns="" w="12700" cap="rnd">
+              <a14:hiddenLine xmlns="" xmlns:a14="http://schemas.microsoft.com/office/drawing/2010/main" w="12700" cap="rnd">
                 <a:solidFill>
                   <a:schemeClr val="tx1"/>
                 </a:solidFill>
@@ -4700,14 +4700,14 @@
           </a:ln>
           <a:extLst>
             <a:ext uri="{909E8E84-426E-40dd-AFC4-6F175D3DCCD1}">
-              <a14:hiddenFill xmlns:a14="http://schemas.microsoft.com/office/drawing/2010/main" xmlns="">
+              <a14:hiddenFill xmlns="" xmlns:a14="http://schemas.microsoft.com/office/drawing/2010/main">
                 <a:solidFill>
                   <a:srgbClr val="FFFFFF"/>
                 </a:solidFill>
               </a14:hiddenFill>
             </a:ext>
             <a:ext uri="{91240B29-F687-4f45-9708-019B960494DF}">
-              <a14:hiddenLine xmlns:a14="http://schemas.microsoft.com/office/drawing/2010/main" xmlns="" w="12700" cap="rnd">
+              <a14:hiddenLine xmlns="" xmlns:a14="http://schemas.microsoft.com/office/drawing/2010/main" w="12700" cap="rnd">
                 <a:solidFill>
                   <a:schemeClr val="tx1"/>
                 </a:solidFill>
@@ -5075,7 +5075,7 @@
           <p:nvPr>
             <p:extLst>
               <p:ext uri="{D42A27DB-BD31-4B8C-83A1-F6EECF244321}">
-                <p14:modId xmlns:p14="http://schemas.microsoft.com/office/powerpoint/2010/main" val="2304972203"/>
+                <p14:modId xmlns:p14="http://schemas.microsoft.com/office/powerpoint/2010/main" val="3273853931"/>
               </p:ext>
             </p:extLst>
           </p:nvPr>
@@ -5121,6 +5121,1005 @@
                 </a:gridCol>
               </a:tblGrid>
               <a:tr h="707116">
+                <a:tc>
+                  <a:txBody>
+                    <a:bodyPr/>
+                    <a:lstStyle/>
+                    <a:p>
+                      <a:r>
+                        <a:rPr lang="en-US" sz="3600" dirty="0">
+                          <a:solidFill>
+                            <a:schemeClr val="tx1"/>
+                          </a:solidFill>
+                          <a:latin typeface="Times New Roman" charset="0"/>
+                          <a:ea typeface="Times New Roman" charset="0"/>
+                          <a:cs typeface="Times New Roman" charset="0"/>
+                        </a:rPr>
+                        <a:t>Predictor</a:t>
+                      </a:r>
+                    </a:p>
+                  </a:txBody>
+                  <a:tcPr>
+                    <a:lnT w="12700" cap="flat" cmpd="sng" algn="ctr">
+                      <a:solidFill>
+                        <a:schemeClr val="tx1"/>
+                      </a:solidFill>
+                      <a:prstDash val="solid"/>
+                      <a:round/>
+                      <a:headEnd type="none" w="med" len="med"/>
+                      <a:tailEnd type="none" w="med" len="med"/>
+                    </a:lnT>
+                    <a:lnB w="12700" cap="flat" cmpd="sng" algn="ctr">
+                      <a:solidFill>
+                        <a:schemeClr val="tx1"/>
+                      </a:solidFill>
+                      <a:prstDash val="solid"/>
+                      <a:round/>
+                      <a:headEnd type="none" w="med" len="med"/>
+                      <a:tailEnd type="none" w="med" len="med"/>
+                    </a:lnB>
+                    <a:noFill/>
+                  </a:tcPr>
+                </a:tc>
+                <a:tc>
+                  <a:txBody>
+                    <a:bodyPr/>
+                    <a:lstStyle/>
+                    <a:p>
+                      <a:pPr algn="ctr"/>
+                      <a:r>
+                        <a:rPr lang="el-GR" sz="3600" i="1" dirty="0">
+                          <a:solidFill>
+                            <a:schemeClr val="tx1"/>
+                          </a:solidFill>
+                          <a:latin typeface="Times New Roman" charset="0"/>
+                          <a:ea typeface="Times New Roman" charset="0"/>
+                          <a:cs typeface="Times New Roman" charset="0"/>
+                        </a:rPr>
+                        <a:t>β</a:t>
+                      </a:r>
+                      <a:r>
+                        <a:rPr lang="en-US" sz="3600" i="1" dirty="0">
+                          <a:solidFill>
+                            <a:schemeClr val="tx1"/>
+                          </a:solidFill>
+                          <a:latin typeface="Times New Roman" charset="0"/>
+                          <a:ea typeface="Times New Roman" charset="0"/>
+                          <a:cs typeface="Times New Roman" charset="0"/>
+                        </a:rPr>
+                        <a:t> (SE)</a:t>
+                      </a:r>
+                    </a:p>
+                  </a:txBody>
+                  <a:tcPr>
+                    <a:lnT w="12700" cap="flat" cmpd="sng" algn="ctr">
+                      <a:solidFill>
+                        <a:schemeClr val="tx1"/>
+                      </a:solidFill>
+                      <a:prstDash val="solid"/>
+                      <a:round/>
+                      <a:headEnd type="none" w="med" len="med"/>
+                      <a:tailEnd type="none" w="med" len="med"/>
+                    </a:lnT>
+                    <a:lnB w="12700" cap="flat" cmpd="sng" algn="ctr">
+                      <a:solidFill>
+                        <a:schemeClr val="tx1"/>
+                      </a:solidFill>
+                      <a:prstDash val="solid"/>
+                      <a:round/>
+                      <a:headEnd type="none" w="med" len="med"/>
+                      <a:tailEnd type="none" w="med" len="med"/>
+                    </a:lnB>
+                    <a:noFill/>
+                  </a:tcPr>
+                </a:tc>
+                <a:tc>
+                  <a:txBody>
+                    <a:bodyPr/>
+                    <a:lstStyle/>
+                    <a:p>
+                      <a:pPr algn="ctr"/>
+                      <a:r>
+                        <a:rPr lang="en-US" sz="3600" i="1" dirty="0">
+                          <a:solidFill>
+                            <a:schemeClr val="tx1"/>
+                          </a:solidFill>
+                          <a:latin typeface="Times New Roman" charset="0"/>
+                          <a:ea typeface="Times New Roman" charset="0"/>
+                          <a:cs typeface="Times New Roman" charset="0"/>
+                        </a:rPr>
+                        <a:t>t</a:t>
+                      </a:r>
+                    </a:p>
+                  </a:txBody>
+                  <a:tcPr>
+                    <a:lnT w="12700" cap="flat" cmpd="sng" algn="ctr">
+                      <a:solidFill>
+                        <a:schemeClr val="tx1"/>
+                      </a:solidFill>
+                      <a:prstDash val="solid"/>
+                      <a:round/>
+                      <a:headEnd type="none" w="med" len="med"/>
+                      <a:tailEnd type="none" w="med" len="med"/>
+                    </a:lnT>
+                    <a:lnB w="12700" cap="flat" cmpd="sng" algn="ctr">
+                      <a:solidFill>
+                        <a:schemeClr val="tx1"/>
+                      </a:solidFill>
+                      <a:prstDash val="solid"/>
+                      <a:round/>
+                      <a:headEnd type="none" w="med" len="med"/>
+                      <a:tailEnd type="none" w="med" len="med"/>
+                    </a:lnB>
+                    <a:noFill/>
+                  </a:tcPr>
+                </a:tc>
+                <a:tc>
+                  <a:txBody>
+                    <a:bodyPr/>
+                    <a:lstStyle/>
+                    <a:p>
+                      <a:pPr algn="ctr"/>
+                      <a:r>
+                        <a:rPr lang="en-US" sz="3600" i="1" dirty="0">
+                          <a:solidFill>
+                            <a:schemeClr val="tx1"/>
+                          </a:solidFill>
+                          <a:latin typeface="Times New Roman" charset="0"/>
+                          <a:ea typeface="Times New Roman" charset="0"/>
+                          <a:cs typeface="Times New Roman" charset="0"/>
+                        </a:rPr>
+                        <a:t>p</a:t>
+                      </a:r>
+                    </a:p>
+                  </a:txBody>
+                  <a:tcPr>
+                    <a:lnT w="12700" cap="flat" cmpd="sng" algn="ctr">
+                      <a:solidFill>
+                        <a:schemeClr val="tx1"/>
+                      </a:solidFill>
+                      <a:prstDash val="solid"/>
+                      <a:round/>
+                      <a:headEnd type="none" w="med" len="med"/>
+                      <a:tailEnd type="none" w="med" len="med"/>
+                    </a:lnT>
+                    <a:lnB w="12700" cap="flat" cmpd="sng" algn="ctr">
+                      <a:solidFill>
+                        <a:schemeClr val="tx1"/>
+                      </a:solidFill>
+                      <a:prstDash val="solid"/>
+                      <a:round/>
+                      <a:headEnd type="none" w="med" len="med"/>
+                      <a:tailEnd type="none" w="med" len="med"/>
+                    </a:lnB>
+                    <a:noFill/>
+                  </a:tcPr>
+                </a:tc>
+                <a:extLst>
+                  <a:ext uri="{0D108BD9-81ED-4DB2-BD59-A6C34878D82A}">
+                    <a16:rowId xmlns:a16="http://schemas.microsoft.com/office/drawing/2014/main" val="10000"/>
+                  </a:ext>
+                </a:extLst>
+              </a:tr>
+              <a:tr h="707116">
+                <a:tc>
+                  <a:txBody>
+                    <a:bodyPr/>
+                    <a:lstStyle/>
+                    <a:p>
+                      <a:r>
+                        <a:rPr lang="en-US" sz="3600" b="0" dirty="0">
+                          <a:solidFill>
+                            <a:schemeClr val="tx1"/>
+                          </a:solidFill>
+                          <a:latin typeface="Times New Roman" charset="0"/>
+                          <a:ea typeface="Times New Roman" charset="0"/>
+                          <a:cs typeface="Times New Roman" charset="0"/>
+                        </a:rPr>
+                        <a:t>FSG</a:t>
+                      </a:r>
+                    </a:p>
+                  </a:txBody>
+                  <a:tcPr>
+                    <a:lnT w="12700" cap="flat" cmpd="sng" algn="ctr">
+                      <a:solidFill>
+                        <a:schemeClr val="tx1"/>
+                      </a:solidFill>
+                      <a:prstDash val="solid"/>
+                      <a:round/>
+                      <a:headEnd type="none" w="med" len="med"/>
+                      <a:tailEnd type="none" w="med" len="med"/>
+                    </a:lnT>
+                    <a:noFill/>
+                  </a:tcPr>
+                </a:tc>
+                <a:tc>
+                  <a:txBody>
+                    <a:bodyPr/>
+                    <a:lstStyle/>
+                    <a:p>
+                      <a:pPr algn="ctr"/>
+                      <a:r>
+                        <a:rPr lang="en-US" sz="3600" b="0" dirty="0">
+                          <a:solidFill>
+                            <a:schemeClr val="tx1"/>
+                          </a:solidFill>
+                          <a:latin typeface="Times New Roman" charset="0"/>
+                          <a:ea typeface="Times New Roman" charset="0"/>
+                          <a:cs typeface="Times New Roman" charset="0"/>
+                        </a:rPr>
+                        <a:t>0.293 (0.029)</a:t>
+                      </a:r>
+                    </a:p>
+                  </a:txBody>
+                  <a:tcPr>
+                    <a:lnT w="12700" cap="flat" cmpd="sng" algn="ctr">
+                      <a:solidFill>
+                        <a:schemeClr val="tx1"/>
+                      </a:solidFill>
+                      <a:prstDash val="solid"/>
+                      <a:round/>
+                      <a:headEnd type="none" w="med" len="med"/>
+                      <a:tailEnd type="none" w="med" len="med"/>
+                    </a:lnT>
+                    <a:noFill/>
+                  </a:tcPr>
+                </a:tc>
+                <a:tc>
+                  <a:txBody>
+                    <a:bodyPr/>
+                    <a:lstStyle/>
+                    <a:p>
+                      <a:pPr algn="ctr"/>
+                      <a:r>
+                        <a:rPr lang="en-US" sz="3600" b="0" dirty="0">
+                          <a:solidFill>
+                            <a:schemeClr val="tx1"/>
+                          </a:solidFill>
+                          <a:latin typeface="Times New Roman" charset="0"/>
+                          <a:ea typeface="Times New Roman" charset="0"/>
+                          <a:cs typeface="Times New Roman" charset="0"/>
+                        </a:rPr>
+                        <a:t>10.066</a:t>
+                      </a:r>
+                    </a:p>
+                  </a:txBody>
+                  <a:tcPr>
+                    <a:lnT w="12700" cap="flat" cmpd="sng" algn="ctr">
+                      <a:solidFill>
+                        <a:schemeClr val="tx1"/>
+                      </a:solidFill>
+                      <a:prstDash val="solid"/>
+                      <a:round/>
+                      <a:headEnd type="none" w="med" len="med"/>
+                      <a:tailEnd type="none" w="med" len="med"/>
+                    </a:lnT>
+                    <a:noFill/>
+                  </a:tcPr>
+                </a:tc>
+                <a:tc>
+                  <a:txBody>
+                    <a:bodyPr/>
+                    <a:lstStyle/>
+                    <a:p>
+                      <a:pPr algn="ctr"/>
+                      <a:r>
+                        <a:rPr lang="en-US" sz="3600" b="0" dirty="0">
+                          <a:solidFill>
+                            <a:schemeClr val="tx1"/>
+                          </a:solidFill>
+                          <a:latin typeface="Times New Roman" charset="0"/>
+                          <a:ea typeface="Times New Roman" charset="0"/>
+                          <a:cs typeface="Times New Roman" charset="0"/>
+                        </a:rPr>
+                        <a:t>&lt; 0.001</a:t>
+                      </a:r>
+                    </a:p>
+                  </a:txBody>
+                  <a:tcPr>
+                    <a:lnT w="12700" cap="flat" cmpd="sng" algn="ctr">
+                      <a:solidFill>
+                        <a:schemeClr val="tx1"/>
+                      </a:solidFill>
+                      <a:prstDash val="solid"/>
+                      <a:round/>
+                      <a:headEnd type="none" w="med" len="med"/>
+                      <a:tailEnd type="none" w="med" len="med"/>
+                    </a:lnT>
+                    <a:noFill/>
+                  </a:tcPr>
+                </a:tc>
+                <a:extLst>
+                  <a:ext uri="{0D108BD9-81ED-4DB2-BD59-A6C34878D82A}">
+                    <a16:rowId xmlns:a16="http://schemas.microsoft.com/office/drawing/2014/main" val="10001"/>
+                  </a:ext>
+                </a:extLst>
+              </a:tr>
+              <a:tr h="707116">
+                <a:tc>
+                  <a:txBody>
+                    <a:bodyPr/>
+                    <a:lstStyle/>
+                    <a:p>
+                      <a:r>
+                        <a:rPr lang="en-US" sz="3600" dirty="0">
+                          <a:solidFill>
+                            <a:schemeClr val="tx1"/>
+                          </a:solidFill>
+                          <a:latin typeface="Times New Roman" charset="0"/>
+                          <a:ea typeface="Times New Roman" charset="0"/>
+                          <a:cs typeface="Times New Roman" charset="0"/>
+                        </a:rPr>
+                        <a:t>COS</a:t>
+                      </a:r>
+                    </a:p>
+                  </a:txBody>
+                  <a:tcPr>
+                    <a:noFill/>
+                  </a:tcPr>
+                </a:tc>
+                <a:tc>
+                  <a:txBody>
+                    <a:bodyPr/>
+                    <a:lstStyle/>
+                    <a:p>
+                      <a:pPr algn="ctr"/>
+                      <a:r>
+                        <a:rPr lang="en-US" sz="3600" i="0" dirty="0">
+                          <a:solidFill>
+                            <a:schemeClr val="tx1"/>
+                          </a:solidFill>
+                          <a:latin typeface="Times New Roman" charset="0"/>
+                          <a:ea typeface="Times New Roman" charset="0"/>
+                          <a:cs typeface="Times New Roman" charset="0"/>
+                        </a:rPr>
+                        <a:t>0.178 (0.015)</a:t>
+                      </a:r>
+                    </a:p>
+                  </a:txBody>
+                  <a:tcPr>
+                    <a:noFill/>
+                  </a:tcPr>
+                </a:tc>
+                <a:tc>
+                  <a:txBody>
+                    <a:bodyPr/>
+                    <a:lstStyle/>
+                    <a:p>
+                      <a:pPr algn="ctr"/>
+                      <a:r>
+                        <a:rPr lang="en-US" sz="3600" dirty="0">
+                          <a:solidFill>
+                            <a:schemeClr val="tx1"/>
+                          </a:solidFill>
+                          <a:latin typeface="Times New Roman" charset="0"/>
+                          <a:ea typeface="Times New Roman" charset="0"/>
+                          <a:cs typeface="Times New Roman" charset="0"/>
+                        </a:rPr>
+                        <a:t>11.972</a:t>
+                      </a:r>
+                    </a:p>
+                  </a:txBody>
+                  <a:tcPr>
+                    <a:noFill/>
+                  </a:tcPr>
+                </a:tc>
+                <a:tc>
+                  <a:txBody>
+                    <a:bodyPr/>
+                    <a:lstStyle/>
+                    <a:p>
+                      <a:pPr algn="ctr"/>
+                      <a:r>
+                        <a:rPr lang="en-US" sz="3600" dirty="0">
+                          <a:solidFill>
+                            <a:schemeClr val="tx1"/>
+                          </a:solidFill>
+                          <a:latin typeface="Times New Roman" charset="0"/>
+                          <a:ea typeface="Times New Roman" charset="0"/>
+                          <a:cs typeface="Times New Roman" charset="0"/>
+                        </a:rPr>
+                        <a:t>&lt; 0.001</a:t>
+                      </a:r>
+                    </a:p>
+                  </a:txBody>
+                  <a:tcPr>
+                    <a:noFill/>
+                  </a:tcPr>
+                </a:tc>
+                <a:extLst>
+                  <a:ext uri="{0D108BD9-81ED-4DB2-BD59-A6C34878D82A}">
+                    <a16:rowId xmlns:a16="http://schemas.microsoft.com/office/drawing/2014/main" val="10002"/>
+                  </a:ext>
+                </a:extLst>
+              </a:tr>
+              <a:tr h="707116">
+                <a:tc>
+                  <a:txBody>
+                    <a:bodyPr/>
+                    <a:lstStyle/>
+                    <a:p>
+                      <a:r>
+                        <a:rPr lang="en-US" sz="3600" b="0" dirty="0">
+                          <a:solidFill>
+                            <a:schemeClr val="tx1"/>
+                          </a:solidFill>
+                          <a:latin typeface="Times New Roman" charset="0"/>
+                          <a:ea typeface="Times New Roman" charset="0"/>
+                          <a:cs typeface="Times New Roman" charset="0"/>
+                        </a:rPr>
+                        <a:t>LSA</a:t>
+                      </a:r>
+                    </a:p>
+                  </a:txBody>
+                  <a:tcPr>
+                    <a:lnB w="12700" cap="flat" cmpd="sng" algn="ctr">
+                      <a:noFill/>
+                      <a:prstDash val="solid"/>
+                      <a:round/>
+                      <a:headEnd type="none" w="med" len="med"/>
+                      <a:tailEnd type="none" w="med" len="med"/>
+                    </a:lnB>
+                    <a:noFill/>
+                  </a:tcPr>
+                </a:tc>
+                <a:tc>
+                  <a:txBody>
+                    <a:bodyPr/>
+                    <a:lstStyle/>
+                    <a:p>
+                      <a:pPr algn="ctr"/>
+                      <a:r>
+                        <a:rPr lang="en-US" sz="3600" b="0" i="0" dirty="0">
+                          <a:solidFill>
+                            <a:schemeClr val="tx1"/>
+                          </a:solidFill>
+                          <a:latin typeface="Times New Roman" charset="0"/>
+                          <a:ea typeface="Times New Roman" charset="0"/>
+                          <a:cs typeface="Times New Roman" charset="0"/>
+                        </a:rPr>
+                        <a:t>0.091 (0.024)</a:t>
+                      </a:r>
+                    </a:p>
+                  </a:txBody>
+                  <a:tcPr>
+                    <a:lnB w="12700" cap="flat" cmpd="sng" algn="ctr">
+                      <a:noFill/>
+                      <a:prstDash val="solid"/>
+                      <a:round/>
+                      <a:headEnd type="none" w="med" len="med"/>
+                      <a:tailEnd type="none" w="med" len="med"/>
+                    </a:lnB>
+                    <a:noFill/>
+                  </a:tcPr>
+                </a:tc>
+                <a:tc>
+                  <a:txBody>
+                    <a:bodyPr/>
+                    <a:lstStyle/>
+                    <a:p>
+                      <a:pPr algn="ctr"/>
+                      <a:r>
+                        <a:rPr lang="en-US" sz="3600" b="0" dirty="0">
+                          <a:solidFill>
+                            <a:schemeClr val="tx1"/>
+                          </a:solidFill>
+                          <a:latin typeface="Times New Roman" charset="0"/>
+                          <a:ea typeface="Times New Roman" charset="0"/>
+                          <a:cs typeface="Times New Roman" charset="0"/>
+                        </a:rPr>
+                        <a:t>3.819</a:t>
+                      </a:r>
+                    </a:p>
+                  </a:txBody>
+                  <a:tcPr>
+                    <a:lnB w="12700" cap="flat" cmpd="sng" algn="ctr">
+                      <a:noFill/>
+                      <a:prstDash val="solid"/>
+                      <a:round/>
+                      <a:headEnd type="none" w="med" len="med"/>
+                      <a:tailEnd type="none" w="med" len="med"/>
+                    </a:lnB>
+                    <a:noFill/>
+                  </a:tcPr>
+                </a:tc>
+                <a:tc>
+                  <a:txBody>
+                    <a:bodyPr/>
+                    <a:lstStyle/>
+                    <a:p>
+                      <a:pPr algn="ctr"/>
+                      <a:r>
+                        <a:rPr lang="en-US" sz="3600" b="0" dirty="0">
+                          <a:solidFill>
+                            <a:schemeClr val="tx1"/>
+                          </a:solidFill>
+                          <a:latin typeface="Times New Roman" charset="0"/>
+                          <a:ea typeface="Times New Roman" charset="0"/>
+                          <a:cs typeface="Times New Roman" charset="0"/>
+                        </a:rPr>
+                        <a:t>&lt; 0.001</a:t>
+                      </a:r>
+                    </a:p>
+                  </a:txBody>
+                  <a:tcPr>
+                    <a:lnB w="12700" cap="flat" cmpd="sng" algn="ctr">
+                      <a:noFill/>
+                      <a:prstDash val="solid"/>
+                      <a:round/>
+                      <a:headEnd type="none" w="med" len="med"/>
+                      <a:tailEnd type="none" w="med" len="med"/>
+                    </a:lnB>
+                    <a:noFill/>
+                  </a:tcPr>
+                </a:tc>
+                <a:extLst>
+                  <a:ext uri="{0D108BD9-81ED-4DB2-BD59-A6C34878D82A}">
+                    <a16:rowId xmlns:a16="http://schemas.microsoft.com/office/drawing/2014/main" val="10003"/>
+                  </a:ext>
+                </a:extLst>
+              </a:tr>
+              <a:tr h="707116">
+                <a:tc>
+                  <a:txBody>
+                    <a:bodyPr/>
+                    <a:lstStyle/>
+                    <a:p>
+                      <a:r>
+                        <a:rPr lang="en-US" sz="3600" b="0" dirty="0">
+                          <a:solidFill>
+                            <a:schemeClr val="tx1"/>
+                          </a:solidFill>
+                          <a:latin typeface="Times New Roman" charset="0"/>
+                          <a:ea typeface="Times New Roman" charset="0"/>
+                          <a:cs typeface="Times New Roman" charset="0"/>
+                        </a:rPr>
+                        <a:t>FSG:COS:LAS</a:t>
+                      </a:r>
+                    </a:p>
+                  </a:txBody>
+                  <a:tcPr>
+                    <a:lnT w="12700" cap="flat" cmpd="sng" algn="ctr">
+                      <a:noFill/>
+                      <a:prstDash val="solid"/>
+                      <a:round/>
+                      <a:headEnd type="none" w="med" len="med"/>
+                      <a:tailEnd type="none" w="med" len="med"/>
+                    </a:lnT>
+                    <a:lnB w="12700" cap="flat" cmpd="sng" algn="ctr">
+                      <a:solidFill>
+                        <a:schemeClr val="tx1"/>
+                      </a:solidFill>
+                      <a:prstDash val="solid"/>
+                      <a:round/>
+                      <a:headEnd type="none" w="med" len="med"/>
+                      <a:tailEnd type="none" w="med" len="med"/>
+                    </a:lnB>
+                    <a:noFill/>
+                  </a:tcPr>
+                </a:tc>
+                <a:tc>
+                  <a:txBody>
+                    <a:bodyPr/>
+                    <a:lstStyle/>
+                    <a:p>
+                      <a:pPr algn="ctr"/>
+                      <a:r>
+                        <a:rPr lang="en-US" sz="3600" b="0" i="0" dirty="0">
+                          <a:solidFill>
+                            <a:schemeClr val="tx1"/>
+                          </a:solidFill>
+                          <a:latin typeface="Times New Roman" charset="0"/>
+                          <a:ea typeface="Times New Roman" charset="0"/>
+                          <a:cs typeface="Times New Roman" charset="0"/>
+                        </a:rPr>
+                        <a:t>2.629 (0.606)</a:t>
+                      </a:r>
+                    </a:p>
+                  </a:txBody>
+                  <a:tcPr>
+                    <a:lnT w="12700" cap="flat" cmpd="sng" algn="ctr">
+                      <a:noFill/>
+                      <a:prstDash val="solid"/>
+                      <a:round/>
+                      <a:headEnd type="none" w="med" len="med"/>
+                      <a:tailEnd type="none" w="med" len="med"/>
+                    </a:lnT>
+                    <a:lnB w="12700" cap="flat" cmpd="sng" algn="ctr">
+                      <a:solidFill>
+                        <a:schemeClr val="tx1"/>
+                      </a:solidFill>
+                      <a:prstDash val="solid"/>
+                      <a:round/>
+                      <a:headEnd type="none" w="med" len="med"/>
+                      <a:tailEnd type="none" w="med" len="med"/>
+                    </a:lnB>
+                    <a:noFill/>
+                  </a:tcPr>
+                </a:tc>
+                <a:tc>
+                  <a:txBody>
+                    <a:bodyPr/>
+                    <a:lstStyle/>
+                    <a:p>
+                      <a:pPr algn="ctr"/>
+                      <a:r>
+                        <a:rPr lang="en-US" sz="3600" b="0" dirty="0">
+                          <a:solidFill>
+                            <a:schemeClr val="tx1"/>
+                          </a:solidFill>
+                          <a:latin typeface="Times New Roman" charset="0"/>
+                          <a:ea typeface="Times New Roman" charset="0"/>
+                          <a:cs typeface="Times New Roman" charset="0"/>
+                        </a:rPr>
+                        <a:t>4.337</a:t>
+                      </a:r>
+                    </a:p>
+                  </a:txBody>
+                  <a:tcPr>
+                    <a:lnT w="12700" cap="flat" cmpd="sng" algn="ctr">
+                      <a:noFill/>
+                      <a:prstDash val="solid"/>
+                      <a:round/>
+                      <a:headEnd type="none" w="med" len="med"/>
+                      <a:tailEnd type="none" w="med" len="med"/>
+                    </a:lnT>
+                    <a:lnB w="12700" cap="flat" cmpd="sng" algn="ctr">
+                      <a:solidFill>
+                        <a:schemeClr val="tx1"/>
+                      </a:solidFill>
+                      <a:prstDash val="solid"/>
+                      <a:round/>
+                      <a:headEnd type="none" w="med" len="med"/>
+                      <a:tailEnd type="none" w="med" len="med"/>
+                    </a:lnB>
+                    <a:noFill/>
+                  </a:tcPr>
+                </a:tc>
+                <a:tc>
+                  <a:txBody>
+                    <a:bodyPr/>
+                    <a:lstStyle/>
+                    <a:p>
+                      <a:pPr algn="ctr"/>
+                      <a:r>
+                        <a:rPr lang="en-US" sz="3600" b="0" dirty="0">
+                          <a:solidFill>
+                            <a:schemeClr val="tx1"/>
+                          </a:solidFill>
+                          <a:latin typeface="Times New Roman" charset="0"/>
+                          <a:ea typeface="Times New Roman" charset="0"/>
+                          <a:cs typeface="Times New Roman" charset="0"/>
+                        </a:rPr>
+                        <a:t>&lt; 0.001</a:t>
+                      </a:r>
+                    </a:p>
+                  </a:txBody>
+                  <a:tcPr>
+                    <a:lnT w="12700" cap="flat" cmpd="sng" algn="ctr">
+                      <a:noFill/>
+                      <a:prstDash val="solid"/>
+                      <a:round/>
+                      <a:headEnd type="none" w="med" len="med"/>
+                      <a:tailEnd type="none" w="med" len="med"/>
+                    </a:lnT>
+                    <a:lnB w="12700" cap="flat" cmpd="sng" algn="ctr">
+                      <a:solidFill>
+                        <a:schemeClr val="tx1"/>
+                      </a:solidFill>
+                      <a:prstDash val="solid"/>
+                      <a:round/>
+                      <a:headEnd type="none" w="med" len="med"/>
+                      <a:tailEnd type="none" w="med" len="med"/>
+                    </a:lnB>
+                    <a:noFill/>
+                  </a:tcPr>
+                </a:tc>
+                <a:extLst>
+                  <a:ext uri="{0D108BD9-81ED-4DB2-BD59-A6C34878D82A}">
+                    <a16:rowId xmlns:a16="http://schemas.microsoft.com/office/drawing/2014/main" val="1496162150"/>
+                  </a:ext>
+                </a:extLst>
+              </a:tr>
+              <a:tr h="707116">
+                <a:tc>
+                  <a:txBody>
+                    <a:bodyPr/>
+                    <a:lstStyle/>
+                    <a:p>
+                      <a:endParaRPr lang="en-US" sz="3600" dirty="0">
+                        <a:solidFill>
+                          <a:schemeClr val="tx1"/>
+                        </a:solidFill>
+                        <a:latin typeface="Times New Roman" charset="0"/>
+                        <a:ea typeface="Times New Roman" charset="0"/>
+                        <a:cs typeface="Times New Roman" charset="0"/>
+                      </a:endParaRPr>
+                    </a:p>
+                  </a:txBody>
+                  <a:tcPr>
+                    <a:lnT w="12700" cap="flat" cmpd="sng" algn="ctr">
+                      <a:solidFill>
+                        <a:schemeClr val="tx1"/>
+                      </a:solidFill>
+                      <a:prstDash val="solid"/>
+                      <a:round/>
+                      <a:headEnd type="none" w="med" len="med"/>
+                      <a:tailEnd type="none" w="med" len="med"/>
+                    </a:lnT>
+                    <a:noFill/>
+                  </a:tcPr>
+                </a:tc>
+                <a:tc>
+                  <a:txBody>
+                    <a:bodyPr/>
+                    <a:lstStyle/>
+                    <a:p>
+                      <a:pPr algn="ctr"/>
+                      <a:endParaRPr lang="en-US" sz="3600" i="0" dirty="0">
+                        <a:solidFill>
+                          <a:schemeClr val="tx1"/>
+                        </a:solidFill>
+                        <a:latin typeface="Times New Roman" charset="0"/>
+                        <a:ea typeface="Times New Roman" charset="0"/>
+                        <a:cs typeface="Times New Roman" charset="0"/>
+                      </a:endParaRPr>
+                    </a:p>
+                  </a:txBody>
+                  <a:tcPr>
+                    <a:lnT w="12700" cap="flat" cmpd="sng" algn="ctr">
+                      <a:solidFill>
+                        <a:schemeClr val="tx1"/>
+                      </a:solidFill>
+                      <a:prstDash val="solid"/>
+                      <a:round/>
+                      <a:headEnd type="none" w="med" len="med"/>
+                      <a:tailEnd type="none" w="med" len="med"/>
+                    </a:lnT>
+                    <a:noFill/>
+                  </a:tcPr>
+                </a:tc>
+                <a:tc>
+                  <a:txBody>
+                    <a:bodyPr/>
+                    <a:lstStyle/>
+                    <a:p>
+                      <a:pPr algn="ctr"/>
+                      <a:endParaRPr lang="en-US" sz="3600" dirty="0">
+                        <a:solidFill>
+                          <a:schemeClr val="tx1"/>
+                        </a:solidFill>
+                        <a:latin typeface="Times New Roman" charset="0"/>
+                        <a:ea typeface="Times New Roman" charset="0"/>
+                        <a:cs typeface="Times New Roman" charset="0"/>
+                      </a:endParaRPr>
+                    </a:p>
+                  </a:txBody>
+                  <a:tcPr>
+                    <a:lnT w="12700" cap="flat" cmpd="sng" algn="ctr">
+                      <a:solidFill>
+                        <a:schemeClr val="tx1"/>
+                      </a:solidFill>
+                      <a:prstDash val="solid"/>
+                      <a:round/>
+                      <a:headEnd type="none" w="med" len="med"/>
+                      <a:tailEnd type="none" w="med" len="med"/>
+                    </a:lnT>
+                    <a:noFill/>
+                  </a:tcPr>
+                </a:tc>
+                <a:tc>
+                  <a:txBody>
+                    <a:bodyPr/>
+                    <a:lstStyle/>
+                    <a:p>
+                      <a:pPr algn="ctr"/>
+                      <a:endParaRPr lang="en-US" sz="3600" dirty="0">
+                        <a:solidFill>
+                          <a:schemeClr val="tx1"/>
+                        </a:solidFill>
+                        <a:latin typeface="Times New Roman" charset="0"/>
+                        <a:ea typeface="Times New Roman" charset="0"/>
+                        <a:cs typeface="Times New Roman" charset="0"/>
+                      </a:endParaRPr>
+                    </a:p>
+                  </a:txBody>
+                  <a:tcPr>
+                    <a:lnT w="12700" cap="flat" cmpd="sng" algn="ctr">
+                      <a:solidFill>
+                        <a:schemeClr val="tx1"/>
+                      </a:solidFill>
+                      <a:prstDash val="solid"/>
+                      <a:round/>
+                      <a:headEnd type="none" w="med" len="med"/>
+                      <a:tailEnd type="none" w="med" len="med"/>
+                    </a:lnT>
+                    <a:noFill/>
+                  </a:tcPr>
+                </a:tc>
+                <a:extLst>
+                  <a:ext uri="{0D108BD9-81ED-4DB2-BD59-A6C34878D82A}">
+                    <a16:rowId xmlns:a16="http://schemas.microsoft.com/office/drawing/2014/main" val="10004"/>
+                  </a:ext>
+                </a:extLst>
+              </a:tr>
+            </a:tbl>
+          </a:graphicData>
+        </a:graphic>
+      </p:graphicFrame>
+      <p:sp>
+        <p:nvSpPr>
+          <p:cNvPr id="35" name="TextBox 34"/>
+          <p:cNvSpPr txBox="1"/>
+          <p:nvPr/>
+        </p:nvSpPr>
+        <p:spPr>
+          <a:xfrm>
+            <a:off x="15698903" y="30592599"/>
+            <a:ext cx="13554832" cy="1508105"/>
+          </a:xfrm>
+          <a:prstGeom prst="rect">
+            <a:avLst/>
+          </a:prstGeom>
+          <a:noFill/>
+        </p:spPr>
+        <p:txBody>
+          <a:bodyPr wrap="square" rtlCol="0">
+            <a:spAutoFit/>
+          </a:bodyPr>
+          <a:lstStyle/>
+          <a:p>
+            <a:r>
+              <a:rPr lang="en-US" sz="2800" i="1" dirty="0">
+                <a:latin typeface="Times New Roman" charset="0"/>
+                <a:ea typeface="Times New Roman" charset="0"/>
+                <a:cs typeface="Times New Roman" charset="0"/>
+              </a:rPr>
+              <a:t>Note: </a:t>
+            </a:r>
+            <a:r>
+              <a:rPr lang="en-US" sz="2800" dirty="0">
+                <a:latin typeface="Times New Roman" charset="0"/>
+                <a:ea typeface="Times New Roman" charset="0"/>
+                <a:cs typeface="Times New Roman" charset="0"/>
+              </a:rPr>
+              <a:t>Judgment scores have been divided by 100 so as to place them on the same scale as recall.</a:t>
+            </a:r>
+            <a:r>
+              <a:rPr lang="en-US" sz="2800" i="1" dirty="0">
+                <a:latin typeface="Times New Roman" charset="0"/>
+                <a:ea typeface="Times New Roman" charset="0"/>
+                <a:cs typeface="Times New Roman" charset="0"/>
+              </a:rPr>
+              <a:t>  </a:t>
+            </a:r>
+          </a:p>
+          <a:p>
+            <a:endParaRPr lang="en-US" sz="3600" dirty="0">
+              <a:latin typeface="Times New Roman" charset="0"/>
+              <a:ea typeface="Times New Roman" charset="0"/>
+              <a:cs typeface="Times New Roman" charset="0"/>
+            </a:endParaRPr>
+          </a:p>
+        </p:txBody>
+      </p:sp>
+      <p:sp>
+        <p:nvSpPr>
+          <p:cNvPr id="24" name="TextBox 23">
+            <a:extLst>
+              <a:ext uri="{FF2B5EF4-FFF2-40B4-BE49-F238E27FC236}">
+                <a16:creationId xmlns:a16="http://schemas.microsoft.com/office/drawing/2014/main" id="{A4B95261-DB08-4B1D-A80A-6CC11E308175}"/>
+              </a:ext>
+            </a:extLst>
+          </p:cNvPr>
+          <p:cNvSpPr txBox="1"/>
+          <p:nvPr/>
+        </p:nvSpPr>
+        <p:spPr>
+          <a:xfrm>
+            <a:off x="15271184" y="9818759"/>
+            <a:ext cx="14311089" cy="830997"/>
+          </a:xfrm>
+          <a:prstGeom prst="rect">
+            <a:avLst/>
+          </a:prstGeom>
+          <a:noFill/>
+        </p:spPr>
+        <p:txBody>
+          <a:bodyPr wrap="square" rtlCol="0">
+            <a:spAutoFit/>
+          </a:bodyPr>
+          <a:lstStyle/>
+          <a:p>
+            <a:pPr algn="ctr"/>
+            <a:r>
+              <a:rPr lang="en-US" sz="3600" b="1" i="1" dirty="0">
+                <a:solidFill>
+                  <a:srgbClr val="7A302F"/>
+                </a:solidFill>
+                <a:latin typeface="Times New Roman"/>
+                <a:ea typeface="MS PGothic" panose="020B0600070205080204" pitchFamily="34" charset="-128"/>
+                <a:cs typeface="Times New Roman"/>
+                <a:sym typeface="Times New Roman Bold" panose="02020803070505020304" pitchFamily="18" charset="0"/>
+              </a:rPr>
+              <a:t>Judgments </a:t>
+            </a:r>
+            <a:endParaRPr lang="en-US" sz="3600" dirty="0">
+              <a:solidFill>
+                <a:srgbClr val="7A302F"/>
+              </a:solidFill>
+              <a:latin typeface="Times New Roman"/>
+              <a:ea typeface="MS PGothic" panose="020B0600070205080204" pitchFamily="34" charset="-128"/>
+              <a:cs typeface="Times New Roman"/>
+              <a:sym typeface="Times New Roman Bold" panose="02020803070505020304" pitchFamily="18" charset="0"/>
+            </a:endParaRPr>
+          </a:p>
+          <a:p>
+            <a:endParaRPr lang="en-US" dirty="0"/>
+          </a:p>
+        </p:txBody>
+      </p:sp>
+      <p:graphicFrame>
+        <p:nvGraphicFramePr>
+          <p:cNvPr id="25" name="Table 24">
+            <a:extLst>
+              <a:ext uri="{FF2B5EF4-FFF2-40B4-BE49-F238E27FC236}">
+                <a16:creationId xmlns:a16="http://schemas.microsoft.com/office/drawing/2014/main" id="{6257BD78-C0EB-4251-A83C-53AA0917F68F}"/>
+              </a:ext>
+            </a:extLst>
+          </p:cNvPr>
+          <p:cNvGraphicFramePr>
+            <a:graphicFrameLocks noGrp="1"/>
+          </p:cNvGraphicFramePr>
+          <p:nvPr>
+            <p:extLst>
+              <p:ext uri="{D42A27DB-BD31-4B8C-83A1-F6EECF244321}">
+                <p14:modId xmlns:p14="http://schemas.microsoft.com/office/powerpoint/2010/main" val="3729231110"/>
+              </p:ext>
+            </p:extLst>
+          </p:nvPr>
+        </p:nvGraphicFramePr>
+        <p:xfrm>
+          <a:off x="15730970" y="6434842"/>
+          <a:ext cx="13582932" cy="3928358"/>
+        </p:xfrm>
+        <a:graphic>
+          <a:graphicData uri="http://schemas.openxmlformats.org/drawingml/2006/table">
+            <a:tbl>
+              <a:tblPr firstRow="1" bandRow="1">
+                <a:tableStyleId>{5C22544A-7EE6-4342-B048-85BDC9FD1C3A}</a:tableStyleId>
+              </a:tblPr>
+              <a:tblGrid>
+                <a:gridCol w="3090430">
+                  <a:extLst>
+                    <a:ext uri="{9D8B030D-6E8A-4147-A177-3AD203B41FA5}">
+                      <a16:colId xmlns:a16="http://schemas.microsoft.com/office/drawing/2014/main" val="20000"/>
+                    </a:ext>
+                  </a:extLst>
+                </a:gridCol>
+                <a:gridCol w="3083886">
+                  <a:extLst>
+                    <a:ext uri="{9D8B030D-6E8A-4147-A177-3AD203B41FA5}">
+                      <a16:colId xmlns:a16="http://schemas.microsoft.com/office/drawing/2014/main" val="20001"/>
+                    </a:ext>
+                  </a:extLst>
+                </a:gridCol>
+                <a:gridCol w="3704308">
+                  <a:extLst>
+                    <a:ext uri="{9D8B030D-6E8A-4147-A177-3AD203B41FA5}">
+                      <a16:colId xmlns:a16="http://schemas.microsoft.com/office/drawing/2014/main" val="20002"/>
+                    </a:ext>
+                  </a:extLst>
+                </a:gridCol>
+                <a:gridCol w="3704308">
+                  <a:extLst>
+                    <a:ext uri="{9D8B030D-6E8A-4147-A177-3AD203B41FA5}">
+                      <a16:colId xmlns:a16="http://schemas.microsoft.com/office/drawing/2014/main" val="20003"/>
+                    </a:ext>
+                  </a:extLst>
+                </a:gridCol>
+              </a:tblGrid>
+              <a:tr h="727958">
                 <a:tc>
                   <a:txBody>
                     <a:bodyPr/>
@@ -5301,969 +6300,6 @@
                   </a:ext>
                 </a:extLst>
               </a:tr>
-              <a:tr h="707116">
-                <a:tc>
-                  <a:txBody>
-                    <a:bodyPr/>
-                    <a:lstStyle/>
-                    <a:p>
-                      <a:r>
-                        <a:rPr lang="en-US" sz="3600" b="0" dirty="0">
-                          <a:solidFill>
-                            <a:schemeClr val="tx1"/>
-                          </a:solidFill>
-                          <a:latin typeface="Times New Roman" charset="0"/>
-                          <a:ea typeface="Times New Roman" charset="0"/>
-                          <a:cs typeface="Times New Roman" charset="0"/>
-                        </a:rPr>
-                        <a:t>FSG</a:t>
-                      </a:r>
-                    </a:p>
-                  </a:txBody>
-                  <a:tcPr>
-                    <a:lnT w="12700" cap="flat" cmpd="sng" algn="ctr">
-                      <a:solidFill>
-                        <a:schemeClr val="tx1"/>
-                      </a:solidFill>
-                      <a:prstDash val="solid"/>
-                      <a:round/>
-                      <a:headEnd type="none" w="med" len="med"/>
-                      <a:tailEnd type="none" w="med" len="med"/>
-                    </a:lnT>
-                    <a:noFill/>
-                  </a:tcPr>
-                </a:tc>
-                <a:tc>
-                  <a:txBody>
-                    <a:bodyPr/>
-                    <a:lstStyle/>
-                    <a:p>
-                      <a:pPr algn="ctr"/>
-                      <a:endParaRPr lang="en-US" sz="3600" b="0" dirty="0">
-                        <a:solidFill>
-                          <a:schemeClr val="tx1"/>
-                        </a:solidFill>
-                        <a:latin typeface="Times New Roman" charset="0"/>
-                        <a:ea typeface="Times New Roman" charset="0"/>
-                        <a:cs typeface="Times New Roman" charset="0"/>
-                      </a:endParaRPr>
-                    </a:p>
-                  </a:txBody>
-                  <a:tcPr>
-                    <a:lnT w="12700" cap="flat" cmpd="sng" algn="ctr">
-                      <a:solidFill>
-                        <a:schemeClr val="tx1"/>
-                      </a:solidFill>
-                      <a:prstDash val="solid"/>
-                      <a:round/>
-                      <a:headEnd type="none" w="med" len="med"/>
-                      <a:tailEnd type="none" w="med" len="med"/>
-                    </a:lnT>
-                    <a:noFill/>
-                  </a:tcPr>
-                </a:tc>
-                <a:tc>
-                  <a:txBody>
-                    <a:bodyPr/>
-                    <a:lstStyle/>
-                    <a:p>
-                      <a:pPr algn="ctr"/>
-                      <a:endParaRPr lang="en-US" sz="3600" b="0" dirty="0">
-                        <a:solidFill>
-                          <a:schemeClr val="tx1"/>
-                        </a:solidFill>
-                        <a:latin typeface="Times New Roman" charset="0"/>
-                        <a:ea typeface="Times New Roman" charset="0"/>
-                        <a:cs typeface="Times New Roman" charset="0"/>
-                      </a:endParaRPr>
-                    </a:p>
-                  </a:txBody>
-                  <a:tcPr>
-                    <a:lnT w="12700" cap="flat" cmpd="sng" algn="ctr">
-                      <a:solidFill>
-                        <a:schemeClr val="tx1"/>
-                      </a:solidFill>
-                      <a:prstDash val="solid"/>
-                      <a:round/>
-                      <a:headEnd type="none" w="med" len="med"/>
-                      <a:tailEnd type="none" w="med" len="med"/>
-                    </a:lnT>
-                    <a:noFill/>
-                  </a:tcPr>
-                </a:tc>
-                <a:tc>
-                  <a:txBody>
-                    <a:bodyPr/>
-                    <a:lstStyle/>
-                    <a:p>
-                      <a:pPr algn="ctr"/>
-                      <a:endParaRPr lang="en-US" sz="3600" b="0" dirty="0">
-                        <a:solidFill>
-                          <a:schemeClr val="tx1"/>
-                        </a:solidFill>
-                        <a:latin typeface="Times New Roman" charset="0"/>
-                        <a:ea typeface="Times New Roman" charset="0"/>
-                        <a:cs typeface="Times New Roman" charset="0"/>
-                      </a:endParaRPr>
-                    </a:p>
-                  </a:txBody>
-                  <a:tcPr>
-                    <a:lnT w="12700" cap="flat" cmpd="sng" algn="ctr">
-                      <a:solidFill>
-                        <a:schemeClr val="tx1"/>
-                      </a:solidFill>
-                      <a:prstDash val="solid"/>
-                      <a:round/>
-                      <a:headEnd type="none" w="med" len="med"/>
-                      <a:tailEnd type="none" w="med" len="med"/>
-                    </a:lnT>
-                    <a:noFill/>
-                  </a:tcPr>
-                </a:tc>
-                <a:extLst>
-                  <a:ext uri="{0D108BD9-81ED-4DB2-BD59-A6C34878D82A}">
-                    <a16:rowId xmlns:a16="http://schemas.microsoft.com/office/drawing/2014/main" val="10001"/>
-                  </a:ext>
-                </a:extLst>
-              </a:tr>
-              <a:tr h="707116">
-                <a:tc>
-                  <a:txBody>
-                    <a:bodyPr/>
-                    <a:lstStyle/>
-                    <a:p>
-                      <a:r>
-                        <a:rPr lang="en-US" sz="3600" dirty="0">
-                          <a:solidFill>
-                            <a:schemeClr val="tx1"/>
-                          </a:solidFill>
-                          <a:latin typeface="Times New Roman" charset="0"/>
-                          <a:ea typeface="Times New Roman" charset="0"/>
-                          <a:cs typeface="Times New Roman" charset="0"/>
-                        </a:rPr>
-                        <a:t>COS</a:t>
-                      </a:r>
-                    </a:p>
-                  </a:txBody>
-                  <a:tcPr>
-                    <a:noFill/>
-                  </a:tcPr>
-                </a:tc>
-                <a:tc>
-                  <a:txBody>
-                    <a:bodyPr/>
-                    <a:lstStyle/>
-                    <a:p>
-                      <a:pPr algn="ctr"/>
-                      <a:endParaRPr lang="en-US" sz="3600" i="0" dirty="0">
-                        <a:solidFill>
-                          <a:schemeClr val="tx1"/>
-                        </a:solidFill>
-                        <a:latin typeface="Times New Roman" charset="0"/>
-                        <a:ea typeface="Times New Roman" charset="0"/>
-                        <a:cs typeface="Times New Roman" charset="0"/>
-                      </a:endParaRPr>
-                    </a:p>
-                  </a:txBody>
-                  <a:tcPr>
-                    <a:noFill/>
-                  </a:tcPr>
-                </a:tc>
-                <a:tc>
-                  <a:txBody>
-                    <a:bodyPr/>
-                    <a:lstStyle/>
-                    <a:p>
-                      <a:pPr algn="ctr"/>
-                      <a:endParaRPr lang="en-US" sz="3600" dirty="0">
-                        <a:solidFill>
-                          <a:schemeClr val="tx1"/>
-                        </a:solidFill>
-                        <a:latin typeface="Times New Roman" charset="0"/>
-                        <a:ea typeface="Times New Roman" charset="0"/>
-                        <a:cs typeface="Times New Roman" charset="0"/>
-                      </a:endParaRPr>
-                    </a:p>
-                  </a:txBody>
-                  <a:tcPr>
-                    <a:noFill/>
-                  </a:tcPr>
-                </a:tc>
-                <a:tc>
-                  <a:txBody>
-                    <a:bodyPr/>
-                    <a:lstStyle/>
-                    <a:p>
-                      <a:pPr algn="ctr"/>
-                      <a:endParaRPr lang="en-US" sz="3600" dirty="0">
-                        <a:solidFill>
-                          <a:schemeClr val="tx1"/>
-                        </a:solidFill>
-                        <a:latin typeface="Times New Roman" charset="0"/>
-                        <a:ea typeface="Times New Roman" charset="0"/>
-                        <a:cs typeface="Times New Roman" charset="0"/>
-                      </a:endParaRPr>
-                    </a:p>
-                  </a:txBody>
-                  <a:tcPr>
-                    <a:noFill/>
-                  </a:tcPr>
-                </a:tc>
-                <a:extLst>
-                  <a:ext uri="{0D108BD9-81ED-4DB2-BD59-A6C34878D82A}">
-                    <a16:rowId xmlns:a16="http://schemas.microsoft.com/office/drawing/2014/main" val="10002"/>
-                  </a:ext>
-                </a:extLst>
-              </a:tr>
-              <a:tr h="707116">
-                <a:tc>
-                  <a:txBody>
-                    <a:bodyPr/>
-                    <a:lstStyle/>
-                    <a:p>
-                      <a:r>
-                        <a:rPr lang="en-US" sz="3600" b="0" dirty="0">
-                          <a:solidFill>
-                            <a:schemeClr val="tx1"/>
-                          </a:solidFill>
-                          <a:latin typeface="Times New Roman" charset="0"/>
-                          <a:ea typeface="Times New Roman" charset="0"/>
-                          <a:cs typeface="Times New Roman" charset="0"/>
-                        </a:rPr>
-                        <a:t>LSA</a:t>
-                      </a:r>
-                    </a:p>
-                  </a:txBody>
-                  <a:tcPr>
-                    <a:lnB w="12700" cap="flat" cmpd="sng" algn="ctr">
-                      <a:noFill/>
-                      <a:prstDash val="solid"/>
-                      <a:round/>
-                      <a:headEnd type="none" w="med" len="med"/>
-                      <a:tailEnd type="none" w="med" len="med"/>
-                    </a:lnB>
-                    <a:noFill/>
-                  </a:tcPr>
-                </a:tc>
-                <a:tc>
-                  <a:txBody>
-                    <a:bodyPr/>
-                    <a:lstStyle/>
-                    <a:p>
-                      <a:pPr algn="ctr"/>
-                      <a:endParaRPr lang="en-US" sz="3600" b="0" i="0" dirty="0">
-                        <a:solidFill>
-                          <a:schemeClr val="tx1"/>
-                        </a:solidFill>
-                        <a:latin typeface="Times New Roman" charset="0"/>
-                        <a:ea typeface="Times New Roman" charset="0"/>
-                        <a:cs typeface="Times New Roman" charset="0"/>
-                      </a:endParaRPr>
-                    </a:p>
-                  </a:txBody>
-                  <a:tcPr>
-                    <a:lnB w="12700" cap="flat" cmpd="sng" algn="ctr">
-                      <a:noFill/>
-                      <a:prstDash val="solid"/>
-                      <a:round/>
-                      <a:headEnd type="none" w="med" len="med"/>
-                      <a:tailEnd type="none" w="med" len="med"/>
-                    </a:lnB>
-                    <a:noFill/>
-                  </a:tcPr>
-                </a:tc>
-                <a:tc>
-                  <a:txBody>
-                    <a:bodyPr/>
-                    <a:lstStyle/>
-                    <a:p>
-                      <a:pPr algn="ctr"/>
-                      <a:endParaRPr lang="en-US" sz="3600" b="0" dirty="0">
-                        <a:solidFill>
-                          <a:schemeClr val="tx1"/>
-                        </a:solidFill>
-                        <a:latin typeface="Times New Roman" charset="0"/>
-                        <a:ea typeface="Times New Roman" charset="0"/>
-                        <a:cs typeface="Times New Roman" charset="0"/>
-                      </a:endParaRPr>
-                    </a:p>
-                  </a:txBody>
-                  <a:tcPr>
-                    <a:lnB w="12700" cap="flat" cmpd="sng" algn="ctr">
-                      <a:noFill/>
-                      <a:prstDash val="solid"/>
-                      <a:round/>
-                      <a:headEnd type="none" w="med" len="med"/>
-                      <a:tailEnd type="none" w="med" len="med"/>
-                    </a:lnB>
-                    <a:noFill/>
-                  </a:tcPr>
-                </a:tc>
-                <a:tc>
-                  <a:txBody>
-                    <a:bodyPr/>
-                    <a:lstStyle/>
-                    <a:p>
-                      <a:pPr algn="ctr"/>
-                      <a:endParaRPr lang="en-US" sz="3600" b="0" dirty="0">
-                        <a:solidFill>
-                          <a:schemeClr val="tx1"/>
-                        </a:solidFill>
-                        <a:latin typeface="Times New Roman" charset="0"/>
-                        <a:ea typeface="Times New Roman" charset="0"/>
-                        <a:cs typeface="Times New Roman" charset="0"/>
-                      </a:endParaRPr>
-                    </a:p>
-                  </a:txBody>
-                  <a:tcPr>
-                    <a:lnB w="12700" cap="flat" cmpd="sng" algn="ctr">
-                      <a:noFill/>
-                      <a:prstDash val="solid"/>
-                      <a:round/>
-                      <a:headEnd type="none" w="med" len="med"/>
-                      <a:tailEnd type="none" w="med" len="med"/>
-                    </a:lnB>
-                    <a:noFill/>
-                  </a:tcPr>
-                </a:tc>
-                <a:extLst>
-                  <a:ext uri="{0D108BD9-81ED-4DB2-BD59-A6C34878D82A}">
-                    <a16:rowId xmlns:a16="http://schemas.microsoft.com/office/drawing/2014/main" val="10003"/>
-                  </a:ext>
-                </a:extLst>
-              </a:tr>
-              <a:tr h="707116">
-                <a:tc>
-                  <a:txBody>
-                    <a:bodyPr/>
-                    <a:lstStyle/>
-                    <a:p>
-                      <a:r>
-                        <a:rPr lang="en-US" sz="3600" b="0" dirty="0">
-                          <a:solidFill>
-                            <a:schemeClr val="tx1"/>
-                          </a:solidFill>
-                          <a:latin typeface="Times New Roman" charset="0"/>
-                          <a:ea typeface="Times New Roman" charset="0"/>
-                          <a:cs typeface="Times New Roman" charset="0"/>
-                        </a:rPr>
-                        <a:t>FSG:COS:LAS</a:t>
-                      </a:r>
-                    </a:p>
-                  </a:txBody>
-                  <a:tcPr>
-                    <a:lnT w="12700" cap="flat" cmpd="sng" algn="ctr">
-                      <a:noFill/>
-                      <a:prstDash val="solid"/>
-                      <a:round/>
-                      <a:headEnd type="none" w="med" len="med"/>
-                      <a:tailEnd type="none" w="med" len="med"/>
-                    </a:lnT>
-                    <a:lnB w="12700" cap="flat" cmpd="sng" algn="ctr">
-                      <a:solidFill>
-                        <a:schemeClr val="tx1"/>
-                      </a:solidFill>
-                      <a:prstDash val="solid"/>
-                      <a:round/>
-                      <a:headEnd type="none" w="med" len="med"/>
-                      <a:tailEnd type="none" w="med" len="med"/>
-                    </a:lnB>
-                    <a:noFill/>
-                  </a:tcPr>
-                </a:tc>
-                <a:tc>
-                  <a:txBody>
-                    <a:bodyPr/>
-                    <a:lstStyle/>
-                    <a:p>
-                      <a:pPr algn="ctr"/>
-                      <a:endParaRPr lang="en-US" sz="3600" b="0" i="0" dirty="0">
-                        <a:solidFill>
-                          <a:schemeClr val="tx1"/>
-                        </a:solidFill>
-                        <a:latin typeface="Times New Roman" charset="0"/>
-                        <a:ea typeface="Times New Roman" charset="0"/>
-                        <a:cs typeface="Times New Roman" charset="0"/>
-                      </a:endParaRPr>
-                    </a:p>
-                  </a:txBody>
-                  <a:tcPr>
-                    <a:lnT w="12700" cap="flat" cmpd="sng" algn="ctr">
-                      <a:noFill/>
-                      <a:prstDash val="solid"/>
-                      <a:round/>
-                      <a:headEnd type="none" w="med" len="med"/>
-                      <a:tailEnd type="none" w="med" len="med"/>
-                    </a:lnT>
-                    <a:lnB w="12700" cap="flat" cmpd="sng" algn="ctr">
-                      <a:solidFill>
-                        <a:schemeClr val="tx1"/>
-                      </a:solidFill>
-                      <a:prstDash val="solid"/>
-                      <a:round/>
-                      <a:headEnd type="none" w="med" len="med"/>
-                      <a:tailEnd type="none" w="med" len="med"/>
-                    </a:lnB>
-                    <a:noFill/>
-                  </a:tcPr>
-                </a:tc>
-                <a:tc>
-                  <a:txBody>
-                    <a:bodyPr/>
-                    <a:lstStyle/>
-                    <a:p>
-                      <a:pPr algn="ctr"/>
-                      <a:endParaRPr lang="en-US" sz="3600" b="0" dirty="0">
-                        <a:solidFill>
-                          <a:schemeClr val="tx1"/>
-                        </a:solidFill>
-                        <a:latin typeface="Times New Roman" charset="0"/>
-                        <a:ea typeface="Times New Roman" charset="0"/>
-                        <a:cs typeface="Times New Roman" charset="0"/>
-                      </a:endParaRPr>
-                    </a:p>
-                  </a:txBody>
-                  <a:tcPr>
-                    <a:lnT w="12700" cap="flat" cmpd="sng" algn="ctr">
-                      <a:noFill/>
-                      <a:prstDash val="solid"/>
-                      <a:round/>
-                      <a:headEnd type="none" w="med" len="med"/>
-                      <a:tailEnd type="none" w="med" len="med"/>
-                    </a:lnT>
-                    <a:lnB w="12700" cap="flat" cmpd="sng" algn="ctr">
-                      <a:solidFill>
-                        <a:schemeClr val="tx1"/>
-                      </a:solidFill>
-                      <a:prstDash val="solid"/>
-                      <a:round/>
-                      <a:headEnd type="none" w="med" len="med"/>
-                      <a:tailEnd type="none" w="med" len="med"/>
-                    </a:lnB>
-                    <a:noFill/>
-                  </a:tcPr>
-                </a:tc>
-                <a:tc>
-                  <a:txBody>
-                    <a:bodyPr/>
-                    <a:lstStyle/>
-                    <a:p>
-                      <a:pPr algn="ctr"/>
-                      <a:endParaRPr lang="en-US" sz="3600" b="0" dirty="0">
-                        <a:solidFill>
-                          <a:schemeClr val="tx1"/>
-                        </a:solidFill>
-                        <a:latin typeface="Times New Roman" charset="0"/>
-                        <a:ea typeface="Times New Roman" charset="0"/>
-                        <a:cs typeface="Times New Roman" charset="0"/>
-                      </a:endParaRPr>
-                    </a:p>
-                  </a:txBody>
-                  <a:tcPr>
-                    <a:lnT w="12700" cap="flat" cmpd="sng" algn="ctr">
-                      <a:noFill/>
-                      <a:prstDash val="solid"/>
-                      <a:round/>
-                      <a:headEnd type="none" w="med" len="med"/>
-                      <a:tailEnd type="none" w="med" len="med"/>
-                    </a:lnT>
-                    <a:lnB w="12700" cap="flat" cmpd="sng" algn="ctr">
-                      <a:solidFill>
-                        <a:schemeClr val="tx1"/>
-                      </a:solidFill>
-                      <a:prstDash val="solid"/>
-                      <a:round/>
-                      <a:headEnd type="none" w="med" len="med"/>
-                      <a:tailEnd type="none" w="med" len="med"/>
-                    </a:lnB>
-                    <a:noFill/>
-                  </a:tcPr>
-                </a:tc>
-                <a:extLst>
-                  <a:ext uri="{0D108BD9-81ED-4DB2-BD59-A6C34878D82A}">
-                    <a16:rowId xmlns:a16="http://schemas.microsoft.com/office/drawing/2014/main" val="1496162150"/>
-                  </a:ext>
-                </a:extLst>
-              </a:tr>
-              <a:tr h="707116">
-                <a:tc>
-                  <a:txBody>
-                    <a:bodyPr/>
-                    <a:lstStyle/>
-                    <a:p>
-                      <a:endParaRPr lang="en-US" sz="3600" dirty="0">
-                        <a:solidFill>
-                          <a:schemeClr val="tx1"/>
-                        </a:solidFill>
-                        <a:latin typeface="Times New Roman" charset="0"/>
-                        <a:ea typeface="Times New Roman" charset="0"/>
-                        <a:cs typeface="Times New Roman" charset="0"/>
-                      </a:endParaRPr>
-                    </a:p>
-                  </a:txBody>
-                  <a:tcPr>
-                    <a:lnT w="12700" cap="flat" cmpd="sng" algn="ctr">
-                      <a:solidFill>
-                        <a:schemeClr val="tx1"/>
-                      </a:solidFill>
-                      <a:prstDash val="solid"/>
-                      <a:round/>
-                      <a:headEnd type="none" w="med" len="med"/>
-                      <a:tailEnd type="none" w="med" len="med"/>
-                    </a:lnT>
-                    <a:noFill/>
-                  </a:tcPr>
-                </a:tc>
-                <a:tc>
-                  <a:txBody>
-                    <a:bodyPr/>
-                    <a:lstStyle/>
-                    <a:p>
-                      <a:pPr algn="ctr"/>
-                      <a:endParaRPr lang="en-US" sz="3600" i="0" dirty="0">
-                        <a:solidFill>
-                          <a:schemeClr val="tx1"/>
-                        </a:solidFill>
-                        <a:latin typeface="Times New Roman" charset="0"/>
-                        <a:ea typeface="Times New Roman" charset="0"/>
-                        <a:cs typeface="Times New Roman" charset="0"/>
-                      </a:endParaRPr>
-                    </a:p>
-                  </a:txBody>
-                  <a:tcPr>
-                    <a:lnT w="12700" cap="flat" cmpd="sng" algn="ctr">
-                      <a:solidFill>
-                        <a:schemeClr val="tx1"/>
-                      </a:solidFill>
-                      <a:prstDash val="solid"/>
-                      <a:round/>
-                      <a:headEnd type="none" w="med" len="med"/>
-                      <a:tailEnd type="none" w="med" len="med"/>
-                    </a:lnT>
-                    <a:noFill/>
-                  </a:tcPr>
-                </a:tc>
-                <a:tc>
-                  <a:txBody>
-                    <a:bodyPr/>
-                    <a:lstStyle/>
-                    <a:p>
-                      <a:pPr algn="ctr"/>
-                      <a:endParaRPr lang="en-US" sz="3600" dirty="0">
-                        <a:solidFill>
-                          <a:schemeClr val="tx1"/>
-                        </a:solidFill>
-                        <a:latin typeface="Times New Roman" charset="0"/>
-                        <a:ea typeface="Times New Roman" charset="0"/>
-                        <a:cs typeface="Times New Roman" charset="0"/>
-                      </a:endParaRPr>
-                    </a:p>
-                  </a:txBody>
-                  <a:tcPr>
-                    <a:lnT w="12700" cap="flat" cmpd="sng" algn="ctr">
-                      <a:solidFill>
-                        <a:schemeClr val="tx1"/>
-                      </a:solidFill>
-                      <a:prstDash val="solid"/>
-                      <a:round/>
-                      <a:headEnd type="none" w="med" len="med"/>
-                      <a:tailEnd type="none" w="med" len="med"/>
-                    </a:lnT>
-                    <a:noFill/>
-                  </a:tcPr>
-                </a:tc>
-                <a:tc>
-                  <a:txBody>
-                    <a:bodyPr/>
-                    <a:lstStyle/>
-                    <a:p>
-                      <a:pPr algn="ctr"/>
-                      <a:endParaRPr lang="en-US" sz="3600" dirty="0">
-                        <a:solidFill>
-                          <a:schemeClr val="tx1"/>
-                        </a:solidFill>
-                        <a:latin typeface="Times New Roman" charset="0"/>
-                        <a:ea typeface="Times New Roman" charset="0"/>
-                        <a:cs typeface="Times New Roman" charset="0"/>
-                      </a:endParaRPr>
-                    </a:p>
-                  </a:txBody>
-                  <a:tcPr>
-                    <a:lnT w="12700" cap="flat" cmpd="sng" algn="ctr">
-                      <a:solidFill>
-                        <a:schemeClr val="tx1"/>
-                      </a:solidFill>
-                      <a:prstDash val="solid"/>
-                      <a:round/>
-                      <a:headEnd type="none" w="med" len="med"/>
-                      <a:tailEnd type="none" w="med" len="med"/>
-                    </a:lnT>
-                    <a:noFill/>
-                  </a:tcPr>
-                </a:tc>
-                <a:extLst>
-                  <a:ext uri="{0D108BD9-81ED-4DB2-BD59-A6C34878D82A}">
-                    <a16:rowId xmlns:a16="http://schemas.microsoft.com/office/drawing/2014/main" val="10004"/>
-                  </a:ext>
-                </a:extLst>
-              </a:tr>
-            </a:tbl>
-          </a:graphicData>
-        </a:graphic>
-      </p:graphicFrame>
-      <p:sp>
-        <p:nvSpPr>
-          <p:cNvPr id="35" name="TextBox 34"/>
-          <p:cNvSpPr txBox="1"/>
-          <p:nvPr/>
-        </p:nvSpPr>
-        <p:spPr>
-          <a:xfrm>
-            <a:off x="15759069" y="29779851"/>
-            <a:ext cx="13554832" cy="1508105"/>
-          </a:xfrm>
-          <a:prstGeom prst="rect">
-            <a:avLst/>
-          </a:prstGeom>
-          <a:noFill/>
-        </p:spPr>
-        <p:txBody>
-          <a:bodyPr wrap="square" rtlCol="0">
-            <a:spAutoFit/>
-          </a:bodyPr>
-          <a:lstStyle/>
-          <a:p>
-            <a:r>
-              <a:rPr lang="en-US" sz="2800" i="1" dirty="0">
-                <a:latin typeface="Times New Roman" charset="0"/>
-                <a:ea typeface="Times New Roman" charset="0"/>
-                <a:cs typeface="Times New Roman" charset="0"/>
-              </a:rPr>
-              <a:t>Note: </a:t>
-            </a:r>
-            <a:r>
-              <a:rPr lang="en-US" sz="2800" dirty="0">
-                <a:latin typeface="Times New Roman" charset="0"/>
-                <a:ea typeface="Times New Roman" charset="0"/>
-                <a:cs typeface="Times New Roman" charset="0"/>
-              </a:rPr>
-              <a:t>Judgment scores have been divided by 100 so as to place them on the same scale as recall.</a:t>
-            </a:r>
-            <a:r>
-              <a:rPr lang="en-US" sz="2800" i="1" dirty="0">
-                <a:latin typeface="Times New Roman" charset="0"/>
-                <a:ea typeface="Times New Roman" charset="0"/>
-                <a:cs typeface="Times New Roman" charset="0"/>
-              </a:rPr>
-              <a:t>  </a:t>
-            </a:r>
-          </a:p>
-          <a:p>
-            <a:endParaRPr lang="en-US" sz="3600" dirty="0">
-              <a:latin typeface="Times New Roman" charset="0"/>
-              <a:ea typeface="Times New Roman" charset="0"/>
-              <a:cs typeface="Times New Roman" charset="0"/>
-            </a:endParaRPr>
-          </a:p>
-        </p:txBody>
-      </p:sp>
-      <p:sp>
-        <p:nvSpPr>
-          <p:cNvPr id="24" name="TextBox 23">
-            <a:extLst>
-              <a:ext uri="{FF2B5EF4-FFF2-40B4-BE49-F238E27FC236}">
-                <a16:creationId xmlns:a16="http://schemas.microsoft.com/office/drawing/2014/main" id="{A4B95261-DB08-4B1D-A80A-6CC11E308175}"/>
-              </a:ext>
-            </a:extLst>
-          </p:cNvPr>
-          <p:cNvSpPr txBox="1"/>
-          <p:nvPr/>
-        </p:nvSpPr>
-        <p:spPr>
-          <a:xfrm>
-            <a:off x="15271184" y="9818759"/>
-            <a:ext cx="14311089" cy="830997"/>
-          </a:xfrm>
-          <a:prstGeom prst="rect">
-            <a:avLst/>
-          </a:prstGeom>
-          <a:noFill/>
-        </p:spPr>
-        <p:txBody>
-          <a:bodyPr wrap="square" rtlCol="0">
-            <a:spAutoFit/>
-          </a:bodyPr>
-          <a:lstStyle/>
-          <a:p>
-            <a:pPr algn="ctr"/>
-            <a:r>
-              <a:rPr lang="en-US" sz="3600" b="1" i="1" dirty="0">
-                <a:solidFill>
-                  <a:srgbClr val="7A302F"/>
-                </a:solidFill>
-                <a:latin typeface="Times New Roman"/>
-                <a:ea typeface="MS PGothic" panose="020B0600070205080204" pitchFamily="34" charset="-128"/>
-                <a:cs typeface="Times New Roman"/>
-                <a:sym typeface="Times New Roman Bold" panose="02020803070505020304" pitchFamily="18" charset="0"/>
-              </a:rPr>
-              <a:t>Judgments </a:t>
-            </a:r>
-            <a:endParaRPr lang="en-US" sz="3600" dirty="0">
-              <a:solidFill>
-                <a:srgbClr val="7A302F"/>
-              </a:solidFill>
-              <a:latin typeface="Times New Roman"/>
-              <a:ea typeface="MS PGothic" panose="020B0600070205080204" pitchFamily="34" charset="-128"/>
-              <a:cs typeface="Times New Roman"/>
-              <a:sym typeface="Times New Roman Bold" panose="02020803070505020304" pitchFamily="18" charset="0"/>
-            </a:endParaRPr>
-          </a:p>
-          <a:p>
-            <a:endParaRPr lang="en-US" dirty="0"/>
-          </a:p>
-        </p:txBody>
-      </p:sp>
-      <p:graphicFrame>
-        <p:nvGraphicFramePr>
-          <p:cNvPr id="25" name="Table 24">
-            <a:extLst>
-              <a:ext uri="{FF2B5EF4-FFF2-40B4-BE49-F238E27FC236}">
-                <a16:creationId xmlns:a16="http://schemas.microsoft.com/office/drawing/2014/main" id="{6257BD78-C0EB-4251-A83C-53AA0917F68F}"/>
-              </a:ext>
-            </a:extLst>
-          </p:cNvPr>
-          <p:cNvGraphicFramePr>
-            <a:graphicFrameLocks noGrp="1"/>
-          </p:cNvGraphicFramePr>
-          <p:nvPr>
-            <p:extLst>
-              <p:ext uri="{D42A27DB-BD31-4B8C-83A1-F6EECF244321}">
-                <p14:modId xmlns:p14="http://schemas.microsoft.com/office/powerpoint/2010/main" val="816050304"/>
-              </p:ext>
-            </p:extLst>
-          </p:nvPr>
-        </p:nvGraphicFramePr>
-        <p:xfrm>
-          <a:off x="15730970" y="6434842"/>
-          <a:ext cx="13582932" cy="3840480"/>
-        </p:xfrm>
-        <a:graphic>
-          <a:graphicData uri="http://schemas.openxmlformats.org/drawingml/2006/table">
-            <a:tbl>
-              <a:tblPr firstRow="1" bandRow="1">
-                <a:tableStyleId>{5C22544A-7EE6-4342-B048-85BDC9FD1C3A}</a:tableStyleId>
-              </a:tblPr>
-              <a:tblGrid>
-                <a:gridCol w="3319030">
-                  <a:extLst>
-                    <a:ext uri="{9D8B030D-6E8A-4147-A177-3AD203B41FA5}">
-                      <a16:colId xmlns:a16="http://schemas.microsoft.com/office/drawing/2014/main" val="20000"/>
-                    </a:ext>
-                  </a:extLst>
-                </a:gridCol>
-                <a:gridCol w="2855286">
-                  <a:extLst>
-                    <a:ext uri="{9D8B030D-6E8A-4147-A177-3AD203B41FA5}">
-                      <a16:colId xmlns:a16="http://schemas.microsoft.com/office/drawing/2014/main" val="20001"/>
-                    </a:ext>
-                  </a:extLst>
-                </a:gridCol>
-                <a:gridCol w="3704308">
-                  <a:extLst>
-                    <a:ext uri="{9D8B030D-6E8A-4147-A177-3AD203B41FA5}">
-                      <a16:colId xmlns:a16="http://schemas.microsoft.com/office/drawing/2014/main" val="20002"/>
-                    </a:ext>
-                  </a:extLst>
-                </a:gridCol>
-                <a:gridCol w="3704308">
-                  <a:extLst>
-                    <a:ext uri="{9D8B030D-6E8A-4147-A177-3AD203B41FA5}">
-                      <a16:colId xmlns:a16="http://schemas.microsoft.com/office/drawing/2014/main" val="20003"/>
-                    </a:ext>
-                  </a:extLst>
-                </a:gridCol>
-              </a:tblGrid>
-              <a:tr h="509255">
-                <a:tc>
-                  <a:txBody>
-                    <a:bodyPr/>
-                    <a:lstStyle/>
-                    <a:p>
-                      <a:r>
-                        <a:rPr lang="en-US" sz="3600" dirty="0">
-                          <a:solidFill>
-                            <a:schemeClr val="tx1"/>
-                          </a:solidFill>
-                          <a:latin typeface="Times New Roman" charset="0"/>
-                          <a:ea typeface="Times New Roman" charset="0"/>
-                          <a:cs typeface="Times New Roman" charset="0"/>
-                        </a:rPr>
-                        <a:t>Predictor</a:t>
-                      </a:r>
-                    </a:p>
-                  </a:txBody>
-                  <a:tcPr>
-                    <a:lnT w="12700" cap="flat" cmpd="sng" algn="ctr">
-                      <a:solidFill>
-                        <a:schemeClr val="tx1"/>
-                      </a:solidFill>
-                      <a:prstDash val="solid"/>
-                      <a:round/>
-                      <a:headEnd type="none" w="med" len="med"/>
-                      <a:tailEnd type="none" w="med" len="med"/>
-                    </a:lnT>
-                    <a:lnB w="12700" cap="flat" cmpd="sng" algn="ctr">
-                      <a:solidFill>
-                        <a:schemeClr val="tx1"/>
-                      </a:solidFill>
-                      <a:prstDash val="solid"/>
-                      <a:round/>
-                      <a:headEnd type="none" w="med" len="med"/>
-                      <a:tailEnd type="none" w="med" len="med"/>
-                    </a:lnB>
-                    <a:noFill/>
-                  </a:tcPr>
-                </a:tc>
-                <a:tc>
-                  <a:txBody>
-                    <a:bodyPr/>
-                    <a:lstStyle/>
-                    <a:p>
-                      <a:pPr algn="ctr"/>
-                      <a:r>
-                        <a:rPr lang="el-GR" sz="3600" i="1" dirty="0">
-                          <a:solidFill>
-                            <a:schemeClr val="tx1"/>
-                          </a:solidFill>
-                          <a:latin typeface="Times New Roman" charset="0"/>
-                          <a:ea typeface="Times New Roman" charset="0"/>
-                          <a:cs typeface="Times New Roman" charset="0"/>
-                        </a:rPr>
-                        <a:t>β</a:t>
-                      </a:r>
-                      <a:r>
-                        <a:rPr lang="en-US" sz="3600" i="1" dirty="0">
-                          <a:solidFill>
-                            <a:schemeClr val="tx1"/>
-                          </a:solidFill>
-                          <a:latin typeface="Times New Roman" charset="0"/>
-                          <a:ea typeface="Times New Roman" charset="0"/>
-                          <a:cs typeface="Times New Roman" charset="0"/>
-                        </a:rPr>
-                        <a:t> (SE)</a:t>
-                      </a:r>
-                    </a:p>
-                  </a:txBody>
-                  <a:tcPr>
-                    <a:lnT w="12700" cap="flat" cmpd="sng" algn="ctr">
-                      <a:solidFill>
-                        <a:schemeClr val="tx1"/>
-                      </a:solidFill>
-                      <a:prstDash val="solid"/>
-                      <a:round/>
-                      <a:headEnd type="none" w="med" len="med"/>
-                      <a:tailEnd type="none" w="med" len="med"/>
-                    </a:lnT>
-                    <a:lnB w="12700" cap="flat" cmpd="sng" algn="ctr">
-                      <a:solidFill>
-                        <a:schemeClr val="tx1"/>
-                      </a:solidFill>
-                      <a:prstDash val="solid"/>
-                      <a:round/>
-                      <a:headEnd type="none" w="med" len="med"/>
-                      <a:tailEnd type="none" w="med" len="med"/>
-                    </a:lnB>
-                    <a:noFill/>
-                  </a:tcPr>
-                </a:tc>
-                <a:tc>
-                  <a:txBody>
-                    <a:bodyPr/>
-                    <a:lstStyle/>
-                    <a:p>
-                      <a:pPr algn="ctr"/>
-                      <a:r>
-                        <a:rPr lang="en-US" sz="3600" i="1" dirty="0">
-                          <a:solidFill>
-                            <a:schemeClr val="tx1"/>
-                          </a:solidFill>
-                          <a:latin typeface="Times New Roman" charset="0"/>
-                          <a:ea typeface="Times New Roman" charset="0"/>
-                          <a:cs typeface="Times New Roman" charset="0"/>
-                        </a:rPr>
-                        <a:t>t</a:t>
-                      </a:r>
-                    </a:p>
-                  </a:txBody>
-                  <a:tcPr>
-                    <a:lnT w="12700" cap="flat" cmpd="sng" algn="ctr">
-                      <a:solidFill>
-                        <a:schemeClr val="tx1"/>
-                      </a:solidFill>
-                      <a:prstDash val="solid"/>
-                      <a:round/>
-                      <a:headEnd type="none" w="med" len="med"/>
-                      <a:tailEnd type="none" w="med" len="med"/>
-                    </a:lnT>
-                    <a:lnB w="12700" cap="flat" cmpd="sng" algn="ctr">
-                      <a:solidFill>
-                        <a:schemeClr val="tx1"/>
-                      </a:solidFill>
-                      <a:prstDash val="solid"/>
-                      <a:round/>
-                      <a:headEnd type="none" w="med" len="med"/>
-                      <a:tailEnd type="none" w="med" len="med"/>
-                    </a:lnB>
-                    <a:noFill/>
-                  </a:tcPr>
-                </a:tc>
-                <a:tc>
-                  <a:txBody>
-                    <a:bodyPr/>
-                    <a:lstStyle/>
-                    <a:p>
-                      <a:pPr algn="ctr"/>
-                      <a:r>
-                        <a:rPr lang="en-US" sz="3600" i="1" dirty="0">
-                          <a:solidFill>
-                            <a:schemeClr val="tx1"/>
-                          </a:solidFill>
-                          <a:latin typeface="Times New Roman" charset="0"/>
-                          <a:ea typeface="Times New Roman" charset="0"/>
-                          <a:cs typeface="Times New Roman" charset="0"/>
-                        </a:rPr>
-                        <a:t>p</a:t>
-                      </a:r>
-                    </a:p>
-                  </a:txBody>
-                  <a:tcPr>
-                    <a:lnT w="12700" cap="flat" cmpd="sng" algn="ctr">
-                      <a:solidFill>
-                        <a:schemeClr val="tx1"/>
-                      </a:solidFill>
-                      <a:prstDash val="solid"/>
-                      <a:round/>
-                      <a:headEnd type="none" w="med" len="med"/>
-                      <a:tailEnd type="none" w="med" len="med"/>
-                    </a:lnT>
-                    <a:lnB w="12700" cap="flat" cmpd="sng" algn="ctr">
-                      <a:solidFill>
-                        <a:schemeClr val="tx1"/>
-                      </a:solidFill>
-                      <a:prstDash val="solid"/>
-                      <a:round/>
-                      <a:headEnd type="none" w="med" len="med"/>
-                      <a:tailEnd type="none" w="med" len="med"/>
-                    </a:lnB>
-                    <a:noFill/>
-                  </a:tcPr>
-                </a:tc>
-                <a:extLst>
-                  <a:ext uri="{0D108BD9-81ED-4DB2-BD59-A6C34878D82A}">
-                    <a16:rowId xmlns:a16="http://schemas.microsoft.com/office/drawing/2014/main" val="10000"/>
-                  </a:ext>
-                </a:extLst>
-              </a:tr>
               <a:tr h="579546">
                 <a:tc>
                   <a:txBody>
@@ -6302,14 +6338,17 @@
                     <a:lstStyle/>
                     <a:p>
                       <a:pPr algn="ctr"/>
-                      <a:endParaRPr lang="en-US" sz="3600" b="0" dirty="0">
-                        <a:solidFill>
-                          <a:schemeClr val="tx1"/>
-                        </a:solidFill>
-                        <a:latin typeface="Times New Roman" charset="0"/>
-                        <a:ea typeface="Times New Roman" charset="0"/>
-                        <a:cs typeface="Times New Roman" charset="0"/>
-                      </a:endParaRPr>
+                      <a:r>
+                        <a:rPr lang="en-US" sz="3600" b="0" dirty="0">
+                          <a:solidFill>
+                            <a:schemeClr val="tx1"/>
+                          </a:solidFill>
+                          <a:latin typeface="Times New Roman" charset="0"/>
+                          <a:ea typeface="Times New Roman" charset="0"/>
+                          <a:cs typeface="Times New Roman" charset="0"/>
+                        </a:rPr>
+                        <a:t>1.956 (0.271)</a:t>
+                      </a:r>
                     </a:p>
                   </a:txBody>
                   <a:tcPr>
@@ -6331,14 +6370,17 @@
                     <a:lstStyle/>
                     <a:p>
                       <a:pPr algn="ctr"/>
-                      <a:endParaRPr lang="en-US" sz="3600" b="0" dirty="0">
-                        <a:solidFill>
-                          <a:schemeClr val="tx1"/>
-                        </a:solidFill>
-                        <a:latin typeface="Times New Roman" charset="0"/>
-                        <a:ea typeface="Times New Roman" charset="0"/>
-                        <a:cs typeface="Times New Roman" charset="0"/>
-                      </a:endParaRPr>
+                      <a:r>
+                        <a:rPr lang="en-US" sz="3600" b="0" dirty="0">
+                          <a:solidFill>
+                            <a:schemeClr val="tx1"/>
+                          </a:solidFill>
+                          <a:latin typeface="Times New Roman" charset="0"/>
+                          <a:ea typeface="Times New Roman" charset="0"/>
+                          <a:cs typeface="Times New Roman" charset="0"/>
+                        </a:rPr>
+                        <a:t>7.223</a:t>
+                      </a:r>
                     </a:p>
                   </a:txBody>
                   <a:tcPr>
@@ -6360,14 +6402,17 @@
                     <a:lstStyle/>
                     <a:p>
                       <a:pPr algn="ctr"/>
-                      <a:endParaRPr lang="en-US" sz="3600" b="0" dirty="0">
-                        <a:solidFill>
-                          <a:schemeClr val="tx1"/>
-                        </a:solidFill>
-                        <a:latin typeface="Times New Roman" charset="0"/>
-                        <a:ea typeface="Times New Roman" charset="0"/>
-                        <a:cs typeface="Times New Roman" charset="0"/>
-                      </a:endParaRPr>
+                      <a:r>
+                        <a:rPr lang="en-US" sz="3600" b="0" dirty="0">
+                          <a:solidFill>
+                            <a:schemeClr val="tx1"/>
+                          </a:solidFill>
+                          <a:latin typeface="Times New Roman" charset="0"/>
+                          <a:ea typeface="Times New Roman" charset="0"/>
+                          <a:cs typeface="Times New Roman" charset="0"/>
+                        </a:rPr>
+                        <a:t>&lt; 0.001</a:t>
+                      </a:r>
                     </a:p>
                   </a:txBody>
                   <a:tcPr>
@@ -6418,14 +6463,17 @@
                     <a:lstStyle/>
                     <a:p>
                       <a:pPr algn="ctr"/>
-                      <a:endParaRPr lang="en-US" sz="3600" i="0" dirty="0">
-                        <a:solidFill>
-                          <a:schemeClr val="tx1"/>
-                        </a:solidFill>
-                        <a:latin typeface="Times New Roman" charset="0"/>
-                        <a:ea typeface="Times New Roman" charset="0"/>
-                        <a:cs typeface="Times New Roman" charset="0"/>
-                      </a:endParaRPr>
+                      <a:r>
+                        <a:rPr lang="en-US" sz="3600" i="0" dirty="0">
+                          <a:solidFill>
+                            <a:schemeClr val="tx1"/>
+                          </a:solidFill>
+                          <a:latin typeface="Times New Roman" charset="0"/>
+                          <a:ea typeface="Times New Roman" charset="0"/>
+                          <a:cs typeface="Times New Roman" charset="0"/>
+                        </a:rPr>
+                        <a:t>0.097 (0.137)</a:t>
+                      </a:r>
                     </a:p>
                   </a:txBody>
                   <a:tcPr>
@@ -6438,14 +6486,17 @@
                     <a:lstStyle/>
                     <a:p>
                       <a:pPr algn="ctr"/>
-                      <a:endParaRPr lang="en-US" sz="3600" dirty="0">
-                        <a:solidFill>
-                          <a:schemeClr val="tx1"/>
-                        </a:solidFill>
-                        <a:latin typeface="Times New Roman" charset="0"/>
-                        <a:ea typeface="Times New Roman" charset="0"/>
-                        <a:cs typeface="Times New Roman" charset="0"/>
-                      </a:endParaRPr>
+                      <a:r>
+                        <a:rPr lang="en-US" sz="3600" dirty="0">
+                          <a:solidFill>
+                            <a:schemeClr val="tx1"/>
+                          </a:solidFill>
+                          <a:latin typeface="Times New Roman" charset="0"/>
+                          <a:ea typeface="Times New Roman" charset="0"/>
+                          <a:cs typeface="Times New Roman" charset="0"/>
+                        </a:rPr>
+                        <a:t>0.706</a:t>
+                      </a:r>
                     </a:p>
                   </a:txBody>
                   <a:tcPr>
@@ -6458,14 +6509,17 @@
                     <a:lstStyle/>
                     <a:p>
                       <a:pPr algn="ctr"/>
-                      <a:endParaRPr lang="en-US" sz="3600" dirty="0">
-                        <a:solidFill>
-                          <a:schemeClr val="tx1"/>
-                        </a:solidFill>
-                        <a:latin typeface="Times New Roman" charset="0"/>
-                        <a:ea typeface="Times New Roman" charset="0"/>
-                        <a:cs typeface="Times New Roman" charset="0"/>
-                      </a:endParaRPr>
+                      <a:r>
+                        <a:rPr lang="en-US" sz="3600" dirty="0">
+                          <a:solidFill>
+                            <a:schemeClr val="tx1"/>
+                          </a:solidFill>
+                          <a:latin typeface="Times New Roman" charset="0"/>
+                          <a:ea typeface="Times New Roman" charset="0"/>
+                          <a:cs typeface="Times New Roman" charset="0"/>
+                        </a:rPr>
+                        <a:t>0.480</a:t>
+                      </a:r>
                     </a:p>
                   </a:txBody>
                   <a:tcPr>
@@ -6514,14 +6568,17 @@
                     <a:lstStyle/>
                     <a:p>
                       <a:pPr algn="ctr"/>
-                      <a:endParaRPr lang="en-US" sz="3600" b="0" i="0" dirty="0">
-                        <a:solidFill>
-                          <a:schemeClr val="tx1"/>
-                        </a:solidFill>
-                        <a:latin typeface="Times New Roman" charset="0"/>
-                        <a:ea typeface="Times New Roman" charset="0"/>
-                        <a:cs typeface="Times New Roman" charset="0"/>
-                      </a:endParaRPr>
+                      <a:r>
+                        <a:rPr lang="en-US" sz="3600" b="0" i="0" dirty="0">
+                          <a:solidFill>
+                            <a:schemeClr val="tx1"/>
+                          </a:solidFill>
+                          <a:latin typeface="Times New Roman" charset="0"/>
+                          <a:ea typeface="Times New Roman" charset="0"/>
+                          <a:cs typeface="Times New Roman" charset="0"/>
+                        </a:rPr>
+                        <a:t>0.656 (0.220)</a:t>
+                      </a:r>
                     </a:p>
                   </a:txBody>
                   <a:tcPr>
@@ -6541,14 +6598,17 @@
                     <a:lstStyle/>
                     <a:p>
                       <a:pPr algn="ctr"/>
-                      <a:endParaRPr lang="en-US" sz="3600" b="0" dirty="0">
-                        <a:solidFill>
-                          <a:schemeClr val="tx1"/>
-                        </a:solidFill>
-                        <a:latin typeface="Times New Roman" charset="0"/>
-                        <a:ea typeface="Times New Roman" charset="0"/>
-                        <a:cs typeface="Times New Roman" charset="0"/>
-                      </a:endParaRPr>
+                      <a:r>
+                        <a:rPr lang="en-US" sz="3600" b="0" dirty="0">
+                          <a:solidFill>
+                            <a:schemeClr val="tx1"/>
+                          </a:solidFill>
+                          <a:latin typeface="Times New Roman" charset="0"/>
+                          <a:ea typeface="Times New Roman" charset="0"/>
+                          <a:cs typeface="Times New Roman" charset="0"/>
+                        </a:rPr>
+                        <a:t>2.976</a:t>
+                      </a:r>
                     </a:p>
                   </a:txBody>
                   <a:tcPr>
@@ -6568,14 +6628,17 @@
                     <a:lstStyle/>
                     <a:p>
                       <a:pPr algn="ctr"/>
-                      <a:endParaRPr lang="en-US" sz="3600" b="0" dirty="0">
-                        <a:solidFill>
-                          <a:schemeClr val="tx1"/>
-                        </a:solidFill>
-                        <a:latin typeface="Times New Roman" charset="0"/>
-                        <a:ea typeface="Times New Roman" charset="0"/>
-                        <a:cs typeface="Times New Roman" charset="0"/>
-                      </a:endParaRPr>
+                      <a:r>
+                        <a:rPr lang="en-US" sz="3600" b="0" dirty="0">
+                          <a:solidFill>
+                            <a:schemeClr val="tx1"/>
+                          </a:solidFill>
+                          <a:latin typeface="Times New Roman" charset="0"/>
+                          <a:ea typeface="Times New Roman" charset="0"/>
+                          <a:cs typeface="Times New Roman" charset="0"/>
+                        </a:rPr>
+                        <a:t>0.003</a:t>
+                      </a:r>
                     </a:p>
                   </a:txBody>
                   <a:tcPr>
@@ -6640,14 +6703,17 @@
                     <a:lstStyle/>
                     <a:p>
                       <a:pPr algn="ctr"/>
-                      <a:endParaRPr lang="en-US" sz="3600" b="0" i="0" dirty="0">
-                        <a:solidFill>
-                          <a:schemeClr val="tx1"/>
-                        </a:solidFill>
-                        <a:latin typeface="Times New Roman" charset="0"/>
-                        <a:ea typeface="Times New Roman" charset="0"/>
-                        <a:cs typeface="Times New Roman" charset="0"/>
-                      </a:endParaRPr>
+                      <a:r>
+                        <a:rPr lang="en-US" sz="3600" b="0" i="0" dirty="0">
+                          <a:solidFill>
+                            <a:schemeClr val="tx1"/>
+                          </a:solidFill>
+                          <a:latin typeface="Times New Roman" charset="0"/>
+                          <a:ea typeface="Times New Roman" charset="0"/>
+                          <a:cs typeface="Times New Roman" charset="0"/>
+                        </a:rPr>
+                        <a:t>-15.473 (5.002)</a:t>
+                      </a:r>
                     </a:p>
                   </a:txBody>
                   <a:tcPr>
@@ -6676,14 +6742,17 @@
                     <a:lstStyle/>
                     <a:p>
                       <a:pPr algn="ctr"/>
-                      <a:endParaRPr lang="en-US" sz="3600" b="0" dirty="0">
-                        <a:solidFill>
-                          <a:schemeClr val="tx1"/>
-                        </a:solidFill>
-                        <a:latin typeface="Times New Roman" charset="0"/>
-                        <a:ea typeface="Times New Roman" charset="0"/>
-                        <a:cs typeface="Times New Roman" charset="0"/>
-                      </a:endParaRPr>
+                      <a:r>
+                        <a:rPr lang="en-US" sz="3600" b="0" dirty="0">
+                          <a:solidFill>
+                            <a:schemeClr val="tx1"/>
+                          </a:solidFill>
+                          <a:latin typeface="Times New Roman" charset="0"/>
+                          <a:ea typeface="Times New Roman" charset="0"/>
+                          <a:cs typeface="Times New Roman" charset="0"/>
+                        </a:rPr>
+                        <a:t>-3.093</a:t>
+                      </a:r>
                     </a:p>
                   </a:txBody>
                   <a:tcPr>
@@ -6712,14 +6781,17 @@
                     <a:lstStyle/>
                     <a:p>
                       <a:pPr algn="ctr"/>
-                      <a:endParaRPr lang="en-US" sz="3600" b="0" dirty="0">
-                        <a:solidFill>
-                          <a:schemeClr val="tx1"/>
-                        </a:solidFill>
-                        <a:latin typeface="Times New Roman" charset="0"/>
-                        <a:ea typeface="Times New Roman" charset="0"/>
-                        <a:cs typeface="Times New Roman" charset="0"/>
-                      </a:endParaRPr>
+                      <a:r>
+                        <a:rPr lang="en-US" sz="3600" b="0" dirty="0">
+                          <a:solidFill>
+                            <a:schemeClr val="tx1"/>
+                          </a:solidFill>
+                          <a:latin typeface="Times New Roman" charset="0"/>
+                          <a:ea typeface="Times New Roman" charset="0"/>
+                          <a:cs typeface="Times New Roman" charset="0"/>
+                        </a:rPr>
+                        <a:t>0.002</a:t>
+                      </a:r>
                     </a:p>
                   </a:txBody>
                   <a:tcPr>
@@ -6960,7 +7032,7 @@
           </a:ln>
           <a:extLst>
             <a:ext uri="{909E8E84-426E-40dd-AFC4-6F175D3DCCD1}">
-              <a14:hiddenFill xmlns="" xmlns:a14="http://schemas.microsoft.com/office/drawing/2010/main">
+              <a14:hiddenFill xmlns:a14="http://schemas.microsoft.com/office/drawing/2010/main" xmlns="">
                 <a:noFill/>
               </a14:hiddenFill>
             </a:ext>
@@ -7016,7 +7088,7 @@
           </a:ln>
           <a:extLst>
             <a:ext uri="{909E8E84-426E-40dd-AFC4-6F175D3DCCD1}">
-              <a14:hiddenFill xmlns="" xmlns:a14="http://schemas.microsoft.com/office/drawing/2010/main">
+              <a14:hiddenFill xmlns:a14="http://schemas.microsoft.com/office/drawing/2010/main" xmlns="">
                 <a:noFill/>
               </a14:hiddenFill>
             </a:ext>
@@ -7058,7 +7130,7 @@
         </p:nvSpPr>
         <p:spPr>
           <a:xfrm>
-            <a:off x="15710511" y="20635947"/>
+            <a:off x="15982636" y="20393041"/>
             <a:ext cx="13317216" cy="954107"/>
           </a:xfrm>
           <a:prstGeom prst="rect">
@@ -7421,14 +7493,14 @@
           <p:nvPr>
             <p:extLst>
               <p:ext uri="{D42A27DB-BD31-4B8C-83A1-F6EECF244321}">
-                <p14:modId xmlns:p14="http://schemas.microsoft.com/office/powerpoint/2010/main" val="1321686676"/>
+                <p14:modId xmlns:p14="http://schemas.microsoft.com/office/powerpoint/2010/main" val="308555669"/>
               </p:ext>
             </p:extLst>
           </p:nvPr>
         </p:nvGraphicFramePr>
         <p:xfrm>
           <a:off x="15598020" y="16052653"/>
-          <a:ext cx="13492759" cy="3738616"/>
+          <a:ext cx="13492759" cy="3839675"/>
         </p:xfrm>
         <a:graphic>
           <a:graphicData uri="http://schemas.openxmlformats.org/drawingml/2006/table">
@@ -7437,14 +7509,14 @@
                 <a:tableStyleId>{5C22544A-7EE6-4342-B048-85BDC9FD1C3A}</a:tableStyleId>
               </a:tblPr>
               <a:tblGrid>
-                <a:gridCol w="2076083">
+                <a:gridCol w="1623180">
                   <a:extLst>
                     <a:ext uri="{9D8B030D-6E8A-4147-A177-3AD203B41FA5}">
                       <a16:colId xmlns:a16="http://schemas.microsoft.com/office/drawing/2014/main" val="20000"/>
                     </a:ext>
                   </a:extLst>
                 </a:gridCol>
-                <a:gridCol w="2076083">
+                <a:gridCol w="2528986">
                   <a:extLst>
                     <a:ext uri="{9D8B030D-6E8A-4147-A177-3AD203B41FA5}">
                       <a16:colId xmlns:a16="http://schemas.microsoft.com/office/drawing/2014/main" val="3286202372"/>
@@ -7473,7 +7545,7 @@
                   </a:extLst>
                 </a:gridCol>
               </a:tblGrid>
-              <a:tr h="534088">
+              <a:tr h="635147">
                 <a:tc>
                   <a:txBody>
                     <a:bodyPr/>
@@ -8483,7 +8555,7 @@
         </p:nvSpPr>
         <p:spPr>
           <a:xfrm>
-            <a:off x="15730970" y="19303136"/>
+            <a:off x="15609791" y="19802538"/>
             <a:ext cx="13518655" cy="707886"/>
           </a:xfrm>
           <a:prstGeom prst="rect">
@@ -8549,8 +8621,8 @@
         </p:blipFill>
         <p:spPr>
           <a:xfrm>
-            <a:off x="16560601" y="21622534"/>
-            <a:ext cx="10511953" cy="8144694"/>
+            <a:off x="16137072" y="21100927"/>
+            <a:ext cx="12241285" cy="9484585"/>
           </a:xfrm>
           <a:prstGeom prst="rect">
             <a:avLst/>

</xml_diff>